<commit_message>
Updated ppt for team to review
</commit_message>
<xml_diff>
--- a/NU-Project2_Jobs Analysis.pptx
+++ b/NU-Project2_Jobs Analysis.pptx
@@ -5,10 +5,10 @@
     <p:sldMasterId id="2147483648" r:id="rId1"/>
   </p:sldMasterIdLst>
   <p:notesMasterIdLst>
-    <p:notesMasterId r:id="rId16"/>
+    <p:notesMasterId r:id="rId14"/>
   </p:notesMasterIdLst>
   <p:handoutMasterIdLst>
-    <p:handoutMasterId r:id="rId17"/>
+    <p:handoutMasterId r:id="rId15"/>
   </p:handoutMasterIdLst>
   <p:sldIdLst>
     <p:sldId id="256" r:id="rId2"/>
@@ -17,14 +17,12 @@
     <p:sldId id="312" r:id="rId5"/>
     <p:sldId id="315" r:id="rId6"/>
     <p:sldId id="314" r:id="rId7"/>
-    <p:sldId id="316" r:id="rId8"/>
-    <p:sldId id="317" r:id="rId9"/>
-    <p:sldId id="276" r:id="rId10"/>
-    <p:sldId id="300" r:id="rId11"/>
-    <p:sldId id="296" r:id="rId12"/>
-    <p:sldId id="304" r:id="rId13"/>
-    <p:sldId id="305" r:id="rId14"/>
-    <p:sldId id="307" r:id="rId15"/>
+    <p:sldId id="319" r:id="rId8"/>
+    <p:sldId id="316" r:id="rId9"/>
+    <p:sldId id="320" r:id="rId10"/>
+    <p:sldId id="296" r:id="rId11"/>
+    <p:sldId id="304" r:id="rId12"/>
+    <p:sldId id="305" r:id="rId13"/>
   </p:sldIdLst>
   <p:sldSz cx="9144000" cy="5143500" type="screen16x9"/>
   <p:notesSz cx="6858000" cy="9144000"/>
@@ -134,14 +132,12 @@
             <p14:sldId id="312"/>
             <p14:sldId id="315"/>
             <p14:sldId id="314"/>
+            <p14:sldId id="319"/>
             <p14:sldId id="316"/>
-            <p14:sldId id="317"/>
-            <p14:sldId id="276"/>
-            <p14:sldId id="300"/>
+            <p14:sldId id="320"/>
             <p14:sldId id="296"/>
             <p14:sldId id="304"/>
             <p14:sldId id="305"/>
-            <p14:sldId id="307"/>
           </p14:sldIdLst>
         </p14:section>
       </p14:sectionLst>
@@ -246,7 +242,7 @@
           <a:p>
             <a:fld id="{DE6D1952-4C8C-594A-8D47-CC3EBD31CD69}" type="datetimeFigureOut">
               <a:rPr lang="en-US" smtClean="0"/>
-              <a:t>1/30/2021</a:t>
+              <a:t>2/1/2021</a:t>
             </a:fld>
             <a:endParaRPr lang="en-US"/>
           </a:p>
@@ -412,7 +408,7 @@
           <a:p>
             <a:fld id="{5AE82BA9-193E-D440-8A2C-9653656F2AE3}" type="datetimeFigureOut">
               <a:rPr lang="en-US" smtClean="0"/>
-              <a:t>1/30/2021</a:t>
+              <a:t>2/1/2021</a:t>
             </a:fld>
             <a:endParaRPr lang="en-US"/>
           </a:p>
@@ -1043,7 +1039,7 @@
             <a:fld id="{B362BA78-8688-C546-A03A-2A39F84C0B58}" type="datetime1">
               <a:rPr lang="en-US" smtClean="0"/>
               <a:pPr/>
-              <a:t>1/30/2021</a:t>
+              <a:t>2/1/2021</a:t>
             </a:fld>
             <a:endParaRPr lang="en-US"/>
           </a:p>
@@ -1263,7 +1259,7 @@
             <a:fld id="{EF5B9135-15EF-DE46-84CC-16626B0FAF7F}" type="datetime1">
               <a:rPr lang="en-US" smtClean="0"/>
               <a:pPr/>
-              <a:t>1/30/2021</a:t>
+              <a:t>2/1/2021</a:t>
             </a:fld>
             <a:endParaRPr lang="en-US"/>
           </a:p>
@@ -1511,7 +1507,7 @@
           <a:p>
             <a:fld id="{99477ADD-011F-3541-9724-9C7FC92455D5}" type="datetime1">
               <a:rPr lang="en-US" smtClean="0"/>
-              <a:t>1/30/2021</a:t>
+              <a:t>2/1/2021</a:t>
             </a:fld>
             <a:endParaRPr lang="en-US"/>
           </a:p>
@@ -1625,7 +1621,7 @@
             <a:fld id="{D3421027-4EC0-9C48-8CFB-B8A3104CB056}" type="datetime1">
               <a:rPr lang="en-US" smtClean="0"/>
               <a:pPr/>
-              <a:t>1/30/2021</a:t>
+              <a:t>2/1/2021</a:t>
             </a:fld>
             <a:endParaRPr lang="en-US"/>
           </a:p>
@@ -1891,7 +1887,7 @@
           <a:p>
             <a:fld id="{FA5DAB8B-8178-D047-869E-5A62AF236443}" type="datetime1">
               <a:rPr lang="en-US" smtClean="0"/>
-              <a:t>1/30/2021</a:t>
+              <a:t>2/1/2021</a:t>
             </a:fld>
             <a:endParaRPr lang="en-US" dirty="0"/>
           </a:p>
@@ -2105,7 +2101,7 @@
             <a:fld id="{B9AB8213-A564-3C44-8CA0-968996562138}" type="datetime1">
               <a:rPr lang="en-US" smtClean="0"/>
               <a:pPr/>
-              <a:t>1/30/2021</a:t>
+              <a:t>2/1/2021</a:t>
             </a:fld>
             <a:endParaRPr lang="en-US"/>
           </a:p>
@@ -2375,7 +2371,7 @@
             <a:fld id="{0A83DA12-03A5-114A-ABAE-78CD6BB6AC19}" type="datetime1">
               <a:rPr lang="en-US" smtClean="0"/>
               <a:pPr/>
-              <a:t>1/30/2021</a:t>
+              <a:t>2/1/2021</a:t>
             </a:fld>
             <a:endParaRPr lang="en-US"/>
           </a:p>
@@ -2706,7 +2702,7 @@
             <a:fld id="{1FFF386F-14E4-954A-9EC2-E277FFD66D49}" type="datetime1">
               <a:rPr lang="en-US" smtClean="0"/>
               <a:pPr/>
-              <a:t>1/30/2021</a:t>
+              <a:t>2/1/2021</a:t>
             </a:fld>
             <a:endParaRPr lang="en-US"/>
           </a:p>
@@ -3175,7 +3171,7 @@
             <a:fld id="{D8FFCF06-3344-8345-BEA6-DDAEFCC6ECCE}" type="datetime1">
               <a:rPr lang="en-US" smtClean="0"/>
               <a:pPr/>
-              <a:t>1/30/2021</a:t>
+              <a:t>2/1/2021</a:t>
             </a:fld>
             <a:endParaRPr lang="en-US"/>
           </a:p>
@@ -3318,7 +3314,7 @@
             <a:fld id="{84C6D879-35D4-554E-9D6D-93E8130AA922}" type="datetime1">
               <a:rPr lang="en-US" smtClean="0"/>
               <a:pPr/>
-              <a:t>1/30/2021</a:t>
+              <a:t>2/1/2021</a:t>
             </a:fld>
             <a:endParaRPr lang="en-US"/>
           </a:p>
@@ -3627,7 +3623,7 @@
             <a:fld id="{AB182AE3-760A-8E44-AB65-03A533386DFC}" type="datetime1">
               <a:rPr lang="en-US" smtClean="0"/>
               <a:pPr/>
-              <a:t>1/30/2021</a:t>
+              <a:t>2/1/2021</a:t>
             </a:fld>
             <a:endParaRPr lang="en-US"/>
           </a:p>
@@ -3881,7 +3877,7 @@
           <a:p>
             <a:fld id="{D98C176C-065F-124D-AAA4-94F2B7A2EC7C}" type="datetime1">
               <a:rPr lang="en-US" smtClean="0"/>
-              <a:t>1/30/2021</a:t>
+              <a:t>2/1/2021</a:t>
             </a:fld>
             <a:endParaRPr lang="en-US"/>
           </a:p>
@@ -4344,7 +4340,10 @@
               <a:rPr lang="en-US" dirty="0" err="1"/>
               <a:t>Adzure</a:t>
             </a:r>
-            <a:endParaRPr lang="en-US" dirty="0"/>
+            <a:r>
+              <a:rPr lang="en-US" dirty="0"/>
+              <a:t> Job Search</a:t>
+            </a:r>
           </a:p>
         </p:txBody>
       </p:sp>
@@ -4383,7 +4382,7 @@
           <p:cNvPr id="5" name="Title 4">
             <a:extLst>
               <a:ext uri="{FF2B5EF4-FFF2-40B4-BE49-F238E27FC236}">
-                <a16:creationId xmlns:a16="http://schemas.microsoft.com/office/drawing/2014/main" id="{D4296CC1-D52C-4736-AB4E-1D2D2C75C616}"/>
+                <a16:creationId xmlns:a16="http://schemas.microsoft.com/office/drawing/2014/main" id="{6229D272-CD8F-44E9-8790-217BC2FFC777}"/>
               </a:ext>
             </a:extLst>
           </p:cNvPr>
@@ -4401,14 +4400,48 @@
           <a:p>
             <a:r>
               <a:rPr lang="en-US" dirty="0"/>
-              <a:t>Trend Data</a:t>
-            </a:r>
-          </a:p>
-        </p:txBody>
-      </p:sp>
-      <p:sp>
-        <p:nvSpPr>
-          <p:cNvPr id="4" name="Slide Number Placeholder 3"/>
+              <a:t>BACKUP SLIDES</a:t>
+            </a:r>
+          </a:p>
+        </p:txBody>
+      </p:sp>
+      <p:sp>
+        <p:nvSpPr>
+          <p:cNvPr id="6" name="Text Placeholder 5">
+            <a:extLst>
+              <a:ext uri="{FF2B5EF4-FFF2-40B4-BE49-F238E27FC236}">
+                <a16:creationId xmlns:a16="http://schemas.microsoft.com/office/drawing/2014/main" id="{D7DC2AC3-222C-406D-B69B-1802F4ED9C1B}"/>
+              </a:ext>
+            </a:extLst>
+          </p:cNvPr>
+          <p:cNvSpPr>
+            <a:spLocks noGrp="1"/>
+          </p:cNvSpPr>
+          <p:nvPr>
+            <p:ph type="body" idx="1"/>
+          </p:nvPr>
+        </p:nvSpPr>
+        <p:spPr/>
+        <p:txBody>
+          <a:bodyPr/>
+          <a:lstStyle/>
+          <a:p>
+            <a:r>
+              <a:rPr lang="en-US" dirty="0"/>
+              <a:t>Backup	</a:t>
+            </a:r>
+          </a:p>
+        </p:txBody>
+      </p:sp>
+      <p:sp>
+        <p:nvSpPr>
+          <p:cNvPr id="4" name="Slide Number Placeholder 3">
+            <a:extLst>
+              <a:ext uri="{FF2B5EF4-FFF2-40B4-BE49-F238E27FC236}">
+                <a16:creationId xmlns:a16="http://schemas.microsoft.com/office/drawing/2014/main" id="{8A126BAB-AD9D-4CD8-A7EA-15B31EA7F368}"/>
+              </a:ext>
+            </a:extLst>
+          </p:cNvPr>
           <p:cNvSpPr>
             <a:spLocks noGrp="1"/>
           </p:cNvSpPr>
@@ -4426,645 +4459,14 @@
               <a:pPr/>
               <a:t>9</a:t>
             </a:fld>
-            <a:endParaRPr lang="en-US" dirty="0"/>
-          </a:p>
-        </p:txBody>
-      </p:sp>
-      <p:sp>
-        <p:nvSpPr>
-          <p:cNvPr id="3" name="Content Placeholder 2">
-            <a:extLst>
-              <a:ext uri="{FF2B5EF4-FFF2-40B4-BE49-F238E27FC236}">
-                <a16:creationId xmlns:a16="http://schemas.microsoft.com/office/drawing/2014/main" id="{68CB2294-DAA7-4004-8EFD-36F55B70ED9A}"/>
-              </a:ext>
-            </a:extLst>
-          </p:cNvPr>
-          <p:cNvSpPr>
-            <a:spLocks noGrp="1"/>
-          </p:cNvSpPr>
-          <p:nvPr>
-            <p:ph idx="1"/>
-          </p:nvPr>
-        </p:nvSpPr>
-        <p:spPr>
-          <a:xfrm>
-            <a:off x="577381" y="2251187"/>
-            <a:ext cx="4146550" cy="1337294"/>
-          </a:xfrm>
-        </p:spPr>
-        <p:txBody>
-          <a:bodyPr>
-            <a:normAutofit/>
-          </a:bodyPr>
-          <a:lstStyle/>
-          <a:p>
-            <a:pPr marL="0" indent="0">
-              <a:lnSpc>
-                <a:spcPct val="90000"/>
-              </a:lnSpc>
-              <a:buFont typeface="Arial"/>
-              <a:buNone/>
-            </a:pPr>
-            <a:r>
-              <a:rPr lang="en-US" sz="1600" dirty="0" err="1">
-                <a:hlinkClick r:id="rId2"/>
-              </a:rPr>
-              <a:t>pytrends</a:t>
-            </a:r>
-            <a:r>
-              <a:rPr lang="en-US" sz="1600" dirty="0"/>
-              <a:t> - Unofficial API for Google Trends		$pip install </a:t>
-            </a:r>
-            <a:r>
-              <a:rPr lang="en-US" sz="1600" dirty="0" err="1"/>
-              <a:t>pytrends</a:t>
-            </a:r>
-            <a:endParaRPr lang="en-US" sz="1600" dirty="0"/>
-          </a:p>
-          <a:p>
-            <a:pPr marL="0" indent="0">
-              <a:lnSpc>
-                <a:spcPct val="90000"/>
-              </a:lnSpc>
-              <a:buFont typeface="Arial"/>
-              <a:buNone/>
-            </a:pPr>
-            <a:r>
-              <a:rPr lang="en-US" sz="1600" dirty="0"/>
-              <a:t>- Interface for automating downloads of reports from Google Trends</a:t>
-            </a:r>
-          </a:p>
-          <a:p>
-            <a:endParaRPr lang="en-US" sz="1600" dirty="0"/>
-          </a:p>
-        </p:txBody>
-      </p:sp>
-      <p:sp>
-        <p:nvSpPr>
-          <p:cNvPr id="17" name="Arrow: Right 16">
-            <a:extLst>
-              <a:ext uri="{FF2B5EF4-FFF2-40B4-BE49-F238E27FC236}">
-                <a16:creationId xmlns:a16="http://schemas.microsoft.com/office/drawing/2014/main" id="{AD226FA7-6C6A-4DFA-84C0-2E4EB5133A85}"/>
-              </a:ext>
-            </a:extLst>
-          </p:cNvPr>
-          <p:cNvSpPr/>
-          <p:nvPr/>
-        </p:nvSpPr>
-        <p:spPr>
-          <a:xfrm rot="1195432">
-            <a:off x="5708132" y="1649180"/>
-            <a:ext cx="565062" cy="293257"/>
-          </a:xfrm>
-          <a:prstGeom prst="rightArrow">
-            <a:avLst/>
-          </a:prstGeom>
-        </p:spPr>
-        <p:style>
-          <a:lnRef idx="1">
-            <a:schemeClr val="accent1"/>
-          </a:lnRef>
-          <a:fillRef idx="3">
-            <a:schemeClr val="accent1"/>
-          </a:fillRef>
-          <a:effectRef idx="2">
-            <a:schemeClr val="accent1"/>
-          </a:effectRef>
-          <a:fontRef idx="minor">
-            <a:schemeClr val="lt1"/>
-          </a:fontRef>
-        </p:style>
-        <p:txBody>
-          <a:bodyPr rtlCol="0" anchor="ctr"/>
-          <a:lstStyle/>
-          <a:p>
-            <a:pPr algn="ctr"/>
             <a:endParaRPr lang="en-US"/>
-          </a:p>
-        </p:txBody>
-      </p:sp>
-      <p:sp>
-        <p:nvSpPr>
-          <p:cNvPr id="21" name="Speech Bubble: Rectangle 20">
-            <a:extLst>
-              <a:ext uri="{FF2B5EF4-FFF2-40B4-BE49-F238E27FC236}">
-                <a16:creationId xmlns:a16="http://schemas.microsoft.com/office/drawing/2014/main" id="{96DFCE6E-2ECF-437A-A066-11B2FA473E47}"/>
-              </a:ext>
-            </a:extLst>
-          </p:cNvPr>
-          <p:cNvSpPr/>
-          <p:nvPr/>
-        </p:nvSpPr>
-        <p:spPr>
-          <a:xfrm>
-            <a:off x="3646153" y="3691291"/>
-            <a:ext cx="1398258" cy="451934"/>
-          </a:xfrm>
-          <a:prstGeom prst="wedgeRectCallout">
-            <a:avLst>
-              <a:gd name="adj1" fmla="val 79136"/>
-              <a:gd name="adj2" fmla="val 75947"/>
-            </a:avLst>
-          </a:prstGeom>
-        </p:spPr>
-        <p:style>
-          <a:lnRef idx="1">
-            <a:schemeClr val="dk1"/>
-          </a:lnRef>
-          <a:fillRef idx="2">
-            <a:schemeClr val="dk1"/>
-          </a:fillRef>
-          <a:effectRef idx="1">
-            <a:schemeClr val="dk1"/>
-          </a:effectRef>
-          <a:fontRef idx="minor">
-            <a:schemeClr val="dk1"/>
-          </a:fontRef>
-        </p:style>
-        <p:txBody>
-          <a:bodyPr rtlCol="0" anchor="ctr"/>
-          <a:lstStyle/>
-          <a:p>
-            <a:pPr algn="ctr"/>
-            <a:r>
-              <a:rPr lang="en-US" sz="1000" dirty="0"/>
-              <a:t>Each stock’s CSV data merged with complete CSV dataset</a:t>
-            </a:r>
-          </a:p>
-        </p:txBody>
-      </p:sp>
-      <p:sp>
-        <p:nvSpPr>
-          <p:cNvPr id="23" name="Arrow: Right 22">
-            <a:extLst>
-              <a:ext uri="{FF2B5EF4-FFF2-40B4-BE49-F238E27FC236}">
-                <a16:creationId xmlns:a16="http://schemas.microsoft.com/office/drawing/2014/main" id="{A0CAA4E0-D6BD-4462-9FA9-A2D604A52B25}"/>
-              </a:ext>
-            </a:extLst>
-          </p:cNvPr>
-          <p:cNvSpPr/>
-          <p:nvPr/>
-        </p:nvSpPr>
-        <p:spPr>
-          <a:xfrm rot="5400000">
-            <a:off x="5966426" y="3994272"/>
-            <a:ext cx="269106" cy="293257"/>
-          </a:xfrm>
-          <a:prstGeom prst="rightArrow">
-            <a:avLst/>
-          </a:prstGeom>
-        </p:spPr>
-        <p:style>
-          <a:lnRef idx="1">
-            <a:schemeClr val="accent1"/>
-          </a:lnRef>
-          <a:fillRef idx="3">
-            <a:schemeClr val="accent1"/>
-          </a:fillRef>
-          <a:effectRef idx="2">
-            <a:schemeClr val="accent1"/>
-          </a:effectRef>
-          <a:fontRef idx="minor">
-            <a:schemeClr val="lt1"/>
-          </a:fontRef>
-        </p:style>
-        <p:txBody>
-          <a:bodyPr rtlCol="0" anchor="ctr"/>
-          <a:lstStyle/>
-          <a:p>
-            <a:pPr algn="ctr"/>
-            <a:endParaRPr lang="en-US"/>
-          </a:p>
-        </p:txBody>
-      </p:sp>
-      <p:pic>
-        <p:nvPicPr>
-          <p:cNvPr id="6" name="Picture 5">
-            <a:extLst>
-              <a:ext uri="{FF2B5EF4-FFF2-40B4-BE49-F238E27FC236}">
-                <a16:creationId xmlns:a16="http://schemas.microsoft.com/office/drawing/2014/main" id="{7D0BF0D9-0BF4-45CC-9AA0-AA05C74239C7}"/>
-              </a:ext>
-            </a:extLst>
-          </p:cNvPr>
-          <p:cNvPicPr>
-            <a:picLocks noChangeAspect="1"/>
-          </p:cNvPicPr>
-          <p:nvPr/>
-        </p:nvPicPr>
-        <p:blipFill>
-          <a:blip r:embed="rId3"/>
-          <a:stretch>
-            <a:fillRect/>
-          </a:stretch>
-        </p:blipFill>
-        <p:spPr>
-          <a:xfrm>
-            <a:off x="545188" y="1064433"/>
-            <a:ext cx="2790825" cy="266700"/>
-          </a:xfrm>
-          <a:prstGeom prst="rect">
-            <a:avLst/>
-          </a:prstGeom>
-          <a:ln>
-            <a:noFill/>
-          </a:ln>
-          <a:effectLst>
-            <a:outerShdw blurRad="190500" algn="tl" rotWithShape="0">
-              <a:srgbClr val="000000">
-                <a:alpha val="70000"/>
-              </a:srgbClr>
-            </a:outerShdw>
-          </a:effectLst>
-        </p:spPr>
-      </p:pic>
-      <p:pic>
-        <p:nvPicPr>
-          <p:cNvPr id="9" name="Picture 8">
-            <a:extLst>
-              <a:ext uri="{FF2B5EF4-FFF2-40B4-BE49-F238E27FC236}">
-                <a16:creationId xmlns:a16="http://schemas.microsoft.com/office/drawing/2014/main" id="{9E08612F-D9DD-4238-832F-AD9D8D690569}"/>
-              </a:ext>
-            </a:extLst>
-          </p:cNvPr>
-          <p:cNvPicPr>
-            <a:picLocks noChangeAspect="1"/>
-          </p:cNvPicPr>
-          <p:nvPr/>
-        </p:nvPicPr>
-        <p:blipFill>
-          <a:blip r:embed="rId4"/>
-          <a:stretch>
-            <a:fillRect/>
-          </a:stretch>
-        </p:blipFill>
-        <p:spPr>
-          <a:xfrm>
-            <a:off x="545188" y="1475090"/>
-            <a:ext cx="5227637" cy="469252"/>
-          </a:xfrm>
-          <a:prstGeom prst="rect">
-            <a:avLst/>
-          </a:prstGeom>
-          <a:ln>
-            <a:noFill/>
-          </a:ln>
-          <a:effectLst>
-            <a:outerShdw blurRad="190500" algn="tl" rotWithShape="0">
-              <a:srgbClr val="000000">
-                <a:alpha val="70000"/>
-              </a:srgbClr>
-            </a:outerShdw>
-          </a:effectLst>
-        </p:spPr>
-      </p:pic>
-      <p:pic>
-        <p:nvPicPr>
-          <p:cNvPr id="12" name="Picture 11">
-            <a:extLst>
-              <a:ext uri="{FF2B5EF4-FFF2-40B4-BE49-F238E27FC236}">
-                <a16:creationId xmlns:a16="http://schemas.microsoft.com/office/drawing/2014/main" id="{22192D9F-6971-42A4-9452-03C7D333D617}"/>
-              </a:ext>
-            </a:extLst>
-          </p:cNvPr>
-          <p:cNvPicPr>
-            <a:picLocks noChangeAspect="1"/>
-          </p:cNvPicPr>
-          <p:nvPr/>
-        </p:nvPicPr>
-        <p:blipFill>
-          <a:blip r:embed="rId5"/>
-          <a:stretch>
-            <a:fillRect/>
-          </a:stretch>
-        </p:blipFill>
-        <p:spPr>
-          <a:xfrm>
-            <a:off x="6268183" y="1243713"/>
-            <a:ext cx="1783174" cy="1167630"/>
-          </a:xfrm>
-          <a:prstGeom prst="rect">
-            <a:avLst/>
-          </a:prstGeom>
-          <a:ln>
-            <a:noFill/>
-          </a:ln>
-          <a:effectLst>
-            <a:outerShdw blurRad="190500" algn="tl" rotWithShape="0">
-              <a:srgbClr val="000000">
-                <a:alpha val="70000"/>
-              </a:srgbClr>
-            </a:outerShdw>
-          </a:effectLst>
-        </p:spPr>
-      </p:pic>
-      <p:pic>
-        <p:nvPicPr>
-          <p:cNvPr id="16" name="Picture 15">
-            <a:extLst>
-              <a:ext uri="{FF2B5EF4-FFF2-40B4-BE49-F238E27FC236}">
-                <a16:creationId xmlns:a16="http://schemas.microsoft.com/office/drawing/2014/main" id="{CD74513E-0594-4664-83A3-E0792EB2CBD9}"/>
-              </a:ext>
-            </a:extLst>
-          </p:cNvPr>
-          <p:cNvPicPr>
-            <a:picLocks noChangeAspect="1"/>
-          </p:cNvPicPr>
-          <p:nvPr/>
-        </p:nvPicPr>
-        <p:blipFill>
-          <a:blip r:embed="rId6"/>
-          <a:stretch>
-            <a:fillRect/>
-          </a:stretch>
-        </p:blipFill>
-        <p:spPr>
-          <a:xfrm>
-            <a:off x="5322675" y="2671486"/>
-            <a:ext cx="2143125" cy="1334861"/>
-          </a:xfrm>
-          <a:prstGeom prst="rect">
-            <a:avLst/>
-          </a:prstGeom>
-          <a:ln>
-            <a:noFill/>
-          </a:ln>
-          <a:effectLst>
-            <a:outerShdw blurRad="190500" algn="tl" rotWithShape="0">
-              <a:srgbClr val="000000">
-                <a:alpha val="70000"/>
-              </a:srgbClr>
-            </a:outerShdw>
-          </a:effectLst>
-        </p:spPr>
-      </p:pic>
-      <p:pic>
-        <p:nvPicPr>
-          <p:cNvPr id="24" name="Picture 23">
-            <a:extLst>
-              <a:ext uri="{FF2B5EF4-FFF2-40B4-BE49-F238E27FC236}">
-                <a16:creationId xmlns:a16="http://schemas.microsoft.com/office/drawing/2014/main" id="{437D3942-F6CF-4C2D-980D-EBE5629A2E1C}"/>
-              </a:ext>
-            </a:extLst>
-          </p:cNvPr>
-          <p:cNvPicPr>
-            <a:picLocks noChangeAspect="1"/>
-          </p:cNvPicPr>
-          <p:nvPr/>
-        </p:nvPicPr>
-        <p:blipFill>
-          <a:blip r:embed="rId7"/>
-          <a:stretch>
-            <a:fillRect/>
-          </a:stretch>
-        </p:blipFill>
-        <p:spPr>
-          <a:xfrm>
-            <a:off x="432033" y="4266491"/>
-            <a:ext cx="6653419" cy="269106"/>
-          </a:xfrm>
-          <a:prstGeom prst="rect">
-            <a:avLst/>
-          </a:prstGeom>
-        </p:spPr>
-      </p:pic>
-      <p:sp>
-        <p:nvSpPr>
-          <p:cNvPr id="25" name="Arrow: Right 24">
-            <a:extLst>
-              <a:ext uri="{FF2B5EF4-FFF2-40B4-BE49-F238E27FC236}">
-                <a16:creationId xmlns:a16="http://schemas.microsoft.com/office/drawing/2014/main" id="{ECED4934-94AB-4A34-940C-A165E9E7C3FC}"/>
-              </a:ext>
-            </a:extLst>
-          </p:cNvPr>
-          <p:cNvSpPr/>
-          <p:nvPr/>
-        </p:nvSpPr>
-        <p:spPr>
-          <a:xfrm rot="5400000">
-            <a:off x="6475346" y="2460020"/>
-            <a:ext cx="424297" cy="293257"/>
-          </a:xfrm>
-          <a:prstGeom prst="rightArrow">
-            <a:avLst/>
-          </a:prstGeom>
-        </p:spPr>
-        <p:style>
-          <a:lnRef idx="1">
-            <a:schemeClr val="accent1"/>
-          </a:lnRef>
-          <a:fillRef idx="3">
-            <a:schemeClr val="accent1"/>
-          </a:fillRef>
-          <a:effectRef idx="2">
-            <a:schemeClr val="accent1"/>
-          </a:effectRef>
-          <a:fontRef idx="minor">
-            <a:schemeClr val="lt1"/>
-          </a:fontRef>
-        </p:style>
-        <p:txBody>
-          <a:bodyPr rtlCol="0" anchor="ctr"/>
-          <a:lstStyle/>
-          <a:p>
-            <a:pPr algn="ctr"/>
-            <a:endParaRPr lang="en-US"/>
-          </a:p>
-        </p:txBody>
-      </p:sp>
-      <p:sp>
-        <p:nvSpPr>
-          <p:cNvPr id="22" name="Speech Bubble: Rectangle 21">
-            <a:extLst>
-              <a:ext uri="{FF2B5EF4-FFF2-40B4-BE49-F238E27FC236}">
-                <a16:creationId xmlns:a16="http://schemas.microsoft.com/office/drawing/2014/main" id="{D8CBBEA0-AAF4-401E-900D-36CA96287A44}"/>
-              </a:ext>
-            </a:extLst>
-          </p:cNvPr>
-          <p:cNvSpPr/>
-          <p:nvPr/>
-        </p:nvSpPr>
-        <p:spPr>
-          <a:xfrm>
-            <a:off x="7552215" y="3389924"/>
-            <a:ext cx="786954" cy="299826"/>
-          </a:xfrm>
-          <a:prstGeom prst="wedgeRectCallout">
-            <a:avLst>
-              <a:gd name="adj1" fmla="val -91298"/>
-              <a:gd name="adj2" fmla="val -4533"/>
-            </a:avLst>
-          </a:prstGeom>
-        </p:spPr>
-        <p:style>
-          <a:lnRef idx="1">
-            <a:schemeClr val="dk1"/>
-          </a:lnRef>
-          <a:fillRef idx="2">
-            <a:schemeClr val="dk1"/>
-          </a:fillRef>
-          <a:effectRef idx="1">
-            <a:schemeClr val="dk1"/>
-          </a:effectRef>
-          <a:fontRef idx="minor">
-            <a:schemeClr val="dk1"/>
-          </a:fontRef>
-        </p:style>
-        <p:txBody>
-          <a:bodyPr rtlCol="0" anchor="ctr"/>
-          <a:lstStyle/>
-          <a:p>
-            <a:pPr algn="ctr"/>
-            <a:r>
-              <a:rPr lang="en-US" sz="1000" dirty="0"/>
-              <a:t>Required Fields</a:t>
-            </a:r>
-          </a:p>
-        </p:txBody>
-      </p:sp>
-      <p:sp>
-        <p:nvSpPr>
-          <p:cNvPr id="11" name="Speech Bubble: Rectangle 10">
-            <a:extLst>
-              <a:ext uri="{FF2B5EF4-FFF2-40B4-BE49-F238E27FC236}">
-                <a16:creationId xmlns:a16="http://schemas.microsoft.com/office/drawing/2014/main" id="{33A16886-DB0D-4279-B6CE-6C8A1249649B}"/>
-              </a:ext>
-            </a:extLst>
-          </p:cNvPr>
-          <p:cNvSpPr/>
-          <p:nvPr/>
-        </p:nvSpPr>
-        <p:spPr>
-          <a:xfrm>
-            <a:off x="4394200" y="1089666"/>
-            <a:ext cx="1560149" cy="299826"/>
-          </a:xfrm>
-          <a:prstGeom prst="wedgeRectCallout">
-            <a:avLst>
-              <a:gd name="adj1" fmla="val -60611"/>
-              <a:gd name="adj2" fmla="val 111951"/>
-            </a:avLst>
-          </a:prstGeom>
-        </p:spPr>
-        <p:style>
-          <a:lnRef idx="1">
-            <a:schemeClr val="dk1"/>
-          </a:lnRef>
-          <a:fillRef idx="2">
-            <a:schemeClr val="dk1"/>
-          </a:fillRef>
-          <a:effectRef idx="1">
-            <a:schemeClr val="dk1"/>
-          </a:effectRef>
-          <a:fontRef idx="minor">
-            <a:schemeClr val="dk1"/>
-          </a:fontRef>
-        </p:style>
-        <p:txBody>
-          <a:bodyPr rtlCol="0" anchor="ctr"/>
-          <a:lstStyle/>
-          <a:p>
-            <a:pPr algn="ctr"/>
-            <a:r>
-              <a:rPr lang="en-US" sz="1000" dirty="0"/>
-              <a:t>Import Daily Trend of key word (stock/ticker)</a:t>
-            </a:r>
-          </a:p>
-        </p:txBody>
-      </p:sp>
-      <p:pic>
-        <p:nvPicPr>
-          <p:cNvPr id="7" name="Picture 6">
-            <a:extLst>
-              <a:ext uri="{FF2B5EF4-FFF2-40B4-BE49-F238E27FC236}">
-                <a16:creationId xmlns:a16="http://schemas.microsoft.com/office/drawing/2014/main" id="{7881404B-B6A4-48DF-A552-983890822024}"/>
-              </a:ext>
-            </a:extLst>
-          </p:cNvPr>
-          <p:cNvPicPr>
-            <a:picLocks noChangeAspect="1"/>
-          </p:cNvPicPr>
-          <p:nvPr/>
-        </p:nvPicPr>
-        <p:blipFill>
-          <a:blip r:embed="rId8"/>
-          <a:stretch>
-            <a:fillRect/>
-          </a:stretch>
-        </p:blipFill>
-        <p:spPr>
-          <a:xfrm>
-            <a:off x="6633502" y="210268"/>
-            <a:ext cx="2271490" cy="833911"/>
-          </a:xfrm>
-          <a:prstGeom prst="rect">
-            <a:avLst/>
-          </a:prstGeom>
-          <a:ln>
-            <a:noFill/>
-          </a:ln>
-          <a:effectLst>
-            <a:outerShdw blurRad="190500" algn="tl" rotWithShape="0">
-              <a:srgbClr val="000000">
-                <a:alpha val="70000"/>
-              </a:srgbClr>
-            </a:outerShdw>
-          </a:effectLst>
-        </p:spPr>
-      </p:pic>
-      <p:sp>
-        <p:nvSpPr>
-          <p:cNvPr id="18" name="Speech Bubble: Rectangle 17">
-            <a:extLst>
-              <a:ext uri="{FF2B5EF4-FFF2-40B4-BE49-F238E27FC236}">
-                <a16:creationId xmlns:a16="http://schemas.microsoft.com/office/drawing/2014/main" id="{9762F26C-2963-48CE-9FCB-6296882B566E}"/>
-              </a:ext>
-            </a:extLst>
-          </p:cNvPr>
-          <p:cNvSpPr/>
-          <p:nvPr/>
-        </p:nvSpPr>
-        <p:spPr>
-          <a:xfrm>
-            <a:off x="7942547" y="1714253"/>
-            <a:ext cx="501494" cy="299826"/>
-          </a:xfrm>
-          <a:prstGeom prst="wedgeRectCallout">
-            <a:avLst>
-              <a:gd name="adj1" fmla="val -85983"/>
-              <a:gd name="adj2" fmla="val -32651"/>
-            </a:avLst>
-          </a:prstGeom>
-        </p:spPr>
-        <p:style>
-          <a:lnRef idx="1">
-            <a:schemeClr val="dk1"/>
-          </a:lnRef>
-          <a:fillRef idx="2">
-            <a:schemeClr val="dk1"/>
-          </a:fillRef>
-          <a:effectRef idx="1">
-            <a:schemeClr val="dk1"/>
-          </a:effectRef>
-          <a:fontRef idx="minor">
-            <a:schemeClr val="dk1"/>
-          </a:fontRef>
-        </p:style>
-        <p:txBody>
-          <a:bodyPr rtlCol="0" anchor="ctr"/>
-          <a:lstStyle/>
-          <a:p>
-            <a:pPr algn="ctr"/>
-            <a:r>
-              <a:rPr lang="en-US" sz="1000" dirty="0"/>
-              <a:t>Raw data</a:t>
-            </a:r>
           </a:p>
         </p:txBody>
       </p:sp>
     </p:spTree>
     <p:extLst>
       <p:ext uri="{BB962C8B-B14F-4D97-AF65-F5344CB8AC3E}">
-        <p14:creationId xmlns:p14="http://schemas.microsoft.com/office/powerpoint/2010/main" val="375635131"/>
+        <p14:creationId xmlns:p14="http://schemas.microsoft.com/office/powerpoint/2010/main" val="1876129600"/>
       </p:ext>
     </p:extLst>
   </p:cSld>
@@ -5096,7 +4498,7 @@
           <p:cNvPr id="5" name="Title 4">
             <a:extLst>
               <a:ext uri="{FF2B5EF4-FFF2-40B4-BE49-F238E27FC236}">
-                <a16:creationId xmlns:a16="http://schemas.microsoft.com/office/drawing/2014/main" id="{6229D272-CD8F-44E9-8790-217BC2FFC777}"/>
+                <a16:creationId xmlns:a16="http://schemas.microsoft.com/office/drawing/2014/main" id="{D4296CC1-D52C-4736-AB4E-1D2D2C75C616}"/>
               </a:ext>
             </a:extLst>
           </p:cNvPr>
@@ -5114,48 +4516,14 @@
           <a:p>
             <a:r>
               <a:rPr lang="en-US" dirty="0"/>
-              <a:t>BACKUP SLIDES</a:t>
-            </a:r>
-          </a:p>
-        </p:txBody>
-      </p:sp>
-      <p:sp>
-        <p:nvSpPr>
-          <p:cNvPr id="6" name="Text Placeholder 5">
-            <a:extLst>
-              <a:ext uri="{FF2B5EF4-FFF2-40B4-BE49-F238E27FC236}">
-                <a16:creationId xmlns:a16="http://schemas.microsoft.com/office/drawing/2014/main" id="{D7DC2AC3-222C-406D-B69B-1802F4ED9C1B}"/>
-              </a:ext>
-            </a:extLst>
-          </p:cNvPr>
-          <p:cNvSpPr>
-            <a:spLocks noGrp="1"/>
-          </p:cNvSpPr>
-          <p:nvPr>
-            <p:ph type="body" idx="1"/>
-          </p:nvPr>
-        </p:nvSpPr>
-        <p:spPr/>
-        <p:txBody>
-          <a:bodyPr/>
-          <a:lstStyle/>
-          <a:p>
-            <a:r>
-              <a:rPr lang="en-US" dirty="0"/>
-              <a:t>Backup	</a:t>
-            </a:r>
-          </a:p>
-        </p:txBody>
-      </p:sp>
-      <p:sp>
-        <p:nvSpPr>
-          <p:cNvPr id="4" name="Slide Number Placeholder 3">
-            <a:extLst>
-              <a:ext uri="{FF2B5EF4-FFF2-40B4-BE49-F238E27FC236}">
-                <a16:creationId xmlns:a16="http://schemas.microsoft.com/office/drawing/2014/main" id="{8A126BAB-AD9D-4CD8-A7EA-15B31EA7F368}"/>
-              </a:ext>
-            </a:extLst>
-          </p:cNvPr>
+              <a:t>Project Description</a:t>
+            </a:r>
+          </a:p>
+        </p:txBody>
+      </p:sp>
+      <p:sp>
+        <p:nvSpPr>
+          <p:cNvPr id="4" name="Slide Number Placeholder 3"/>
           <p:cNvSpPr>
             <a:spLocks noGrp="1"/>
           </p:cNvSpPr>
@@ -5173,14 +4541,109 @@
               <a:pPr/>
               <a:t>10</a:t>
             </a:fld>
-            <a:endParaRPr lang="en-US"/>
+            <a:endParaRPr lang="en-US" dirty="0"/>
+          </a:p>
+        </p:txBody>
+      </p:sp>
+      <p:sp>
+        <p:nvSpPr>
+          <p:cNvPr id="7" name="Content Placeholder 6">
+            <a:extLst>
+              <a:ext uri="{FF2B5EF4-FFF2-40B4-BE49-F238E27FC236}">
+                <a16:creationId xmlns:a16="http://schemas.microsoft.com/office/drawing/2014/main" id="{B7837073-5C1D-46BB-A1F0-03E5003E8F35}"/>
+              </a:ext>
+            </a:extLst>
+          </p:cNvPr>
+          <p:cNvSpPr>
+            <a:spLocks noGrp="1"/>
+          </p:cNvSpPr>
+          <p:nvPr>
+            <p:ph idx="1"/>
+          </p:nvPr>
+        </p:nvSpPr>
+        <p:spPr/>
+        <p:txBody>
+          <a:bodyPr>
+            <a:normAutofit/>
+          </a:bodyPr>
+          <a:lstStyle/>
+          <a:p>
+            <a:pPr>
+              <a:spcAft>
+                <a:spcPts val="600"/>
+              </a:spcAft>
+            </a:pPr>
+            <a:r>
+              <a:rPr lang="en-US" sz="1800" dirty="0"/>
+              <a:t>Tell a story with data visualization</a:t>
+            </a:r>
+          </a:p>
+          <a:p>
+            <a:pPr>
+              <a:spcAft>
+                <a:spcPts val="600"/>
+              </a:spcAft>
+            </a:pPr>
+            <a:r>
+              <a:rPr lang="en-US" sz="1800" dirty="0"/>
+              <a:t>Focus on providing users an interactive means to explore data themselves. If daily source can’t be found, warehouse daily to build missing data</a:t>
+            </a:r>
+          </a:p>
+          <a:p>
+            <a:pPr>
+              <a:spcAft>
+                <a:spcPts val="600"/>
+              </a:spcAft>
+            </a:pPr>
+            <a:r>
+              <a:rPr lang="en-US" sz="1800" dirty="0"/>
+              <a:t>Prepare a 5-minute presentation that lays out your theme, coding approach, data munging techniques, and final visualization. </a:t>
+            </a:r>
+          </a:p>
+          <a:p>
+            <a:pPr>
+              <a:spcAft>
+                <a:spcPts val="600"/>
+              </a:spcAft>
+            </a:pPr>
+            <a:r>
+              <a:rPr lang="en-US" sz="1800" dirty="0"/>
+              <a:t>You may choose a project of any theme, but we encourage you to think broadly. </a:t>
+            </a:r>
+          </a:p>
+          <a:p>
+            <a:pPr>
+              <a:spcAft>
+                <a:spcPts val="600"/>
+              </a:spcAft>
+            </a:pPr>
+            <a:r>
+              <a:rPr lang="en-US" sz="1800" dirty="0"/>
+              <a:t>You will have ample time in class to work with your group, but expect to put in hours outside of class as well.</a:t>
+            </a:r>
+          </a:p>
+          <a:p>
+            <a:pPr>
+              <a:spcAft>
+                <a:spcPts val="600"/>
+              </a:spcAft>
+            </a:pPr>
+            <a:endParaRPr lang="en-US" sz="1800" dirty="0"/>
+          </a:p>
+          <a:p>
+            <a:pPr>
+              <a:spcAft>
+                <a:spcPts val="600"/>
+              </a:spcAft>
+            </a:pPr>
+            <a:endParaRPr lang="en-US" sz="1800" dirty="0"/>
           </a:p>
         </p:txBody>
       </p:sp>
     </p:spTree>
     <p:extLst>
       <p:ext uri="{BB962C8B-B14F-4D97-AF65-F5344CB8AC3E}">
-        <p14:creationId xmlns:p14="http://schemas.microsoft.com/office/powerpoint/2010/main" val="1876129600"/>
+        <p14:creationId xmlns:p14="http://schemas.microsoft.com/office/powerpoint/2010/main" val="4146772713"/>
       </p:ext>
     </p:extLst>
   </p:cSld>
@@ -5230,7 +4693,7 @@
           <a:p>
             <a:r>
               <a:rPr lang="en-US" dirty="0"/>
-              <a:t>Project Description</a:t>
+              <a:t>Project Requirements</a:t>
             </a:r>
           </a:p>
         </p:txBody>
@@ -5278,183 +4741,6 @@
         <p:spPr/>
         <p:txBody>
           <a:bodyPr>
-            <a:normAutofit/>
-          </a:bodyPr>
-          <a:lstStyle/>
-          <a:p>
-            <a:pPr>
-              <a:spcAft>
-                <a:spcPts val="600"/>
-              </a:spcAft>
-            </a:pPr>
-            <a:r>
-              <a:rPr lang="en-US" sz="1800" dirty="0"/>
-              <a:t>Tell a story with data visualization</a:t>
-            </a:r>
-          </a:p>
-          <a:p>
-            <a:pPr>
-              <a:spcAft>
-                <a:spcPts val="600"/>
-              </a:spcAft>
-            </a:pPr>
-            <a:r>
-              <a:rPr lang="en-US" sz="1800" dirty="0"/>
-              <a:t>Focus on providing users an interactive means to explore data themselves. If daily source can’t be found, warehouse daily to build missing data</a:t>
-            </a:r>
-          </a:p>
-          <a:p>
-            <a:pPr>
-              <a:spcAft>
-                <a:spcPts val="600"/>
-              </a:spcAft>
-            </a:pPr>
-            <a:r>
-              <a:rPr lang="en-US" sz="1800" dirty="0"/>
-              <a:t>Prepare a 5-minute presentation that lays out your theme, coding approach, data munging techniques, and final visualization. </a:t>
-            </a:r>
-          </a:p>
-          <a:p>
-            <a:pPr>
-              <a:spcAft>
-                <a:spcPts val="600"/>
-              </a:spcAft>
-            </a:pPr>
-            <a:r>
-              <a:rPr lang="en-US" sz="1800" dirty="0"/>
-              <a:t>You may choose a project of any theme, but we encourage you to think broadly. </a:t>
-            </a:r>
-          </a:p>
-          <a:p>
-            <a:pPr>
-              <a:spcAft>
-                <a:spcPts val="600"/>
-              </a:spcAft>
-            </a:pPr>
-            <a:r>
-              <a:rPr lang="en-US" sz="1800" dirty="0"/>
-              <a:t>You will have ample time in class to work with your group, but expect to put in hours outside of class as well.</a:t>
-            </a:r>
-          </a:p>
-          <a:p>
-            <a:pPr>
-              <a:spcAft>
-                <a:spcPts val="600"/>
-              </a:spcAft>
-            </a:pPr>
-            <a:endParaRPr lang="en-US" sz="1800" dirty="0"/>
-          </a:p>
-          <a:p>
-            <a:pPr>
-              <a:spcAft>
-                <a:spcPts val="600"/>
-              </a:spcAft>
-            </a:pPr>
-            <a:endParaRPr lang="en-US" sz="1800" dirty="0"/>
-          </a:p>
-        </p:txBody>
-      </p:sp>
-    </p:spTree>
-    <p:extLst>
-      <p:ext uri="{BB962C8B-B14F-4D97-AF65-F5344CB8AC3E}">
-        <p14:creationId xmlns:p14="http://schemas.microsoft.com/office/powerpoint/2010/main" val="4146772713"/>
-      </p:ext>
-    </p:extLst>
-  </p:cSld>
-  <p:clrMapOvr>
-    <a:masterClrMapping/>
-  </p:clrMapOvr>
-</p:sld>
-</file>
-
-<file path=ppt/slides/slide13.xml><?xml version="1.0" encoding="utf-8"?>
-<p:sld xmlns:a="http://schemas.openxmlformats.org/drawingml/2006/main" xmlns:r="http://schemas.openxmlformats.org/officeDocument/2006/relationships" xmlns:p="http://schemas.openxmlformats.org/presentationml/2006/main">
-  <p:cSld>
-    <p:spTree>
-      <p:nvGrpSpPr>
-        <p:cNvPr id="1" name=""/>
-        <p:cNvGrpSpPr/>
-        <p:nvPr/>
-      </p:nvGrpSpPr>
-      <p:grpSpPr>
-        <a:xfrm>
-          <a:off x="0" y="0"/>
-          <a:ext cx="0" cy="0"/>
-          <a:chOff x="0" y="0"/>
-          <a:chExt cx="0" cy="0"/>
-        </a:xfrm>
-      </p:grpSpPr>
-      <p:sp>
-        <p:nvSpPr>
-          <p:cNvPr id="5" name="Title 4">
-            <a:extLst>
-              <a:ext uri="{FF2B5EF4-FFF2-40B4-BE49-F238E27FC236}">
-                <a16:creationId xmlns:a16="http://schemas.microsoft.com/office/drawing/2014/main" id="{D4296CC1-D52C-4736-AB4E-1D2D2C75C616}"/>
-              </a:ext>
-            </a:extLst>
-          </p:cNvPr>
-          <p:cNvSpPr>
-            <a:spLocks noGrp="1"/>
-          </p:cNvSpPr>
-          <p:nvPr>
-            <p:ph type="title"/>
-          </p:nvPr>
-        </p:nvSpPr>
-        <p:spPr/>
-        <p:txBody>
-          <a:bodyPr/>
-          <a:lstStyle/>
-          <a:p>
-            <a:r>
-              <a:rPr lang="en-US" dirty="0"/>
-              <a:t>Project Requirements</a:t>
-            </a:r>
-          </a:p>
-        </p:txBody>
-      </p:sp>
-      <p:sp>
-        <p:nvSpPr>
-          <p:cNvPr id="4" name="Slide Number Placeholder 3"/>
-          <p:cNvSpPr>
-            <a:spLocks noGrp="1"/>
-          </p:cNvSpPr>
-          <p:nvPr>
-            <p:ph type="sldNum" sz="quarter" idx="12"/>
-          </p:nvPr>
-        </p:nvSpPr>
-        <p:spPr/>
-        <p:txBody>
-          <a:bodyPr/>
-          <a:lstStyle/>
-          <a:p>
-            <a:fld id="{106E12CD-FCB1-464E-A775-0B83FDDACE03}" type="slidenum">
-              <a:rPr lang="en-US" smtClean="0"/>
-              <a:pPr/>
-              <a:t>12</a:t>
-            </a:fld>
-            <a:endParaRPr lang="en-US" dirty="0"/>
-          </a:p>
-        </p:txBody>
-      </p:sp>
-      <p:sp>
-        <p:nvSpPr>
-          <p:cNvPr id="7" name="Content Placeholder 6">
-            <a:extLst>
-              <a:ext uri="{FF2B5EF4-FFF2-40B4-BE49-F238E27FC236}">
-                <a16:creationId xmlns:a16="http://schemas.microsoft.com/office/drawing/2014/main" id="{B7837073-5C1D-46BB-A1F0-03E5003E8F35}"/>
-              </a:ext>
-            </a:extLst>
-          </p:cNvPr>
-          <p:cNvSpPr>
-            <a:spLocks noGrp="1"/>
-          </p:cNvSpPr>
-          <p:nvPr>
-            <p:ph idx="1"/>
-          </p:nvPr>
-        </p:nvSpPr>
-        <p:spPr/>
-        <p:txBody>
-          <a:bodyPr>
             <a:normAutofit fontScale="77500" lnSpcReduction="20000"/>
           </a:bodyPr>
           <a:lstStyle/>
@@ -5610,453 +4896,6 @@
     <p:extLst>
       <p:ext uri="{BB962C8B-B14F-4D97-AF65-F5344CB8AC3E}">
         <p14:creationId xmlns:p14="http://schemas.microsoft.com/office/powerpoint/2010/main" val="1432497776"/>
-      </p:ext>
-    </p:extLst>
-  </p:cSld>
-  <p:clrMapOvr>
-    <a:masterClrMapping/>
-  </p:clrMapOvr>
-</p:sld>
-</file>
-
-<file path=ppt/slides/slide14.xml><?xml version="1.0" encoding="utf-8"?>
-<p:sld xmlns:a="http://schemas.openxmlformats.org/drawingml/2006/main" xmlns:r="http://schemas.openxmlformats.org/officeDocument/2006/relationships" xmlns:p="http://schemas.openxmlformats.org/presentationml/2006/main">
-  <p:cSld>
-    <p:spTree>
-      <p:nvGrpSpPr>
-        <p:cNvPr id="1" name=""/>
-        <p:cNvGrpSpPr/>
-        <p:nvPr/>
-      </p:nvGrpSpPr>
-      <p:grpSpPr>
-        <a:xfrm>
-          <a:off x="0" y="0"/>
-          <a:ext cx="0" cy="0"/>
-          <a:chOff x="0" y="0"/>
-          <a:chExt cx="0" cy="0"/>
-        </a:xfrm>
-      </p:grpSpPr>
-      <p:sp>
-        <p:nvSpPr>
-          <p:cNvPr id="2" name="Title 1">
-            <a:extLst>
-              <a:ext uri="{FF2B5EF4-FFF2-40B4-BE49-F238E27FC236}">
-                <a16:creationId xmlns:a16="http://schemas.microsoft.com/office/drawing/2014/main" id="{048156CD-80AF-4F7D-B7FD-35A4EFC45D27}"/>
-              </a:ext>
-            </a:extLst>
-          </p:cNvPr>
-          <p:cNvSpPr>
-            <a:spLocks noGrp="1"/>
-          </p:cNvSpPr>
-          <p:nvPr>
-            <p:ph type="title"/>
-          </p:nvPr>
-        </p:nvSpPr>
-        <p:spPr/>
-        <p:txBody>
-          <a:bodyPr/>
-          <a:lstStyle/>
-          <a:p>
-            <a:r>
-              <a:rPr lang="en-US" dirty="0"/>
-              <a:t>Notes from Owen</a:t>
-            </a:r>
-          </a:p>
-        </p:txBody>
-      </p:sp>
-      <p:sp>
-        <p:nvSpPr>
-          <p:cNvPr id="3" name="Content Placeholder 2">
-            <a:extLst>
-              <a:ext uri="{FF2B5EF4-FFF2-40B4-BE49-F238E27FC236}">
-                <a16:creationId xmlns:a16="http://schemas.microsoft.com/office/drawing/2014/main" id="{25B73986-7F56-4729-BA3F-72EAA3E97C7E}"/>
-              </a:ext>
-            </a:extLst>
-          </p:cNvPr>
-          <p:cNvSpPr>
-            <a:spLocks noGrp="1"/>
-          </p:cNvSpPr>
-          <p:nvPr>
-            <p:ph idx="1"/>
-          </p:nvPr>
-        </p:nvSpPr>
-        <p:spPr/>
-        <p:txBody>
-          <a:bodyPr>
-            <a:normAutofit fontScale="25000" lnSpcReduction="20000"/>
-          </a:bodyPr>
-          <a:lstStyle/>
-          <a:p>
-            <a:r>
-              <a:rPr lang="en-US" dirty="0"/>
-              <a:t>// To run, type 'flask run' in the terminal. Ctrl + click on </a:t>
-            </a:r>
-            <a:r>
-              <a:rPr lang="en-US" dirty="0" err="1"/>
-              <a:t>url</a:t>
-            </a:r>
-            <a:r>
-              <a:rPr lang="en-US" dirty="0"/>
-              <a:t> to open page</a:t>
-            </a:r>
-          </a:p>
-          <a:p>
-            <a:r>
-              <a:rPr lang="en-US" dirty="0"/>
-              <a:t>var data = </a:t>
-            </a:r>
-            <a:r>
-              <a:rPr lang="en-US" dirty="0" err="1"/>
-              <a:t>JSON.parse</a:t>
-            </a:r>
-            <a:r>
-              <a:rPr lang="en-US" dirty="0"/>
-              <a:t>(d3.select('#</a:t>
-            </a:r>
-            <a:r>
-              <a:rPr lang="en-US" dirty="0" err="1"/>
-              <a:t>dataScript</a:t>
-            </a:r>
-            <a:r>
-              <a:rPr lang="en-US" dirty="0"/>
-              <a:t>').</a:t>
-            </a:r>
-            <a:r>
-              <a:rPr lang="en-US" dirty="0" err="1"/>
-              <a:t>attr</a:t>
-            </a:r>
-            <a:r>
-              <a:rPr lang="en-US" dirty="0"/>
-              <a:t>('</a:t>
-            </a:r>
-            <a:r>
-              <a:rPr lang="en-US" dirty="0" err="1"/>
-              <a:t>indata</a:t>
-            </a:r>
-            <a:r>
-              <a:rPr lang="en-US" dirty="0"/>
-              <a:t>'));</a:t>
-            </a:r>
-          </a:p>
-          <a:p>
-            <a:br>
-              <a:rPr lang="en-US" dirty="0"/>
-            </a:br>
-            <a:r>
-              <a:rPr lang="en-US" dirty="0"/>
-              <a:t>// the program starts with the flask </a:t>
-            </a:r>
-            <a:r>
-              <a:rPr lang="en-US" dirty="0" err="1"/>
-              <a:t>app;this</a:t>
-            </a:r>
-            <a:r>
-              <a:rPr lang="en-US" dirty="0"/>
-              <a:t> is what we are doing in app.py "</a:t>
-            </a:r>
-            <a:r>
-              <a:rPr lang="en-US" dirty="0" err="1"/>
-              <a:t>myclient</a:t>
-            </a:r>
-            <a:r>
-              <a:rPr lang="en-US" dirty="0"/>
-              <a:t>" indicates where the client lives</a:t>
-            </a:r>
-          </a:p>
-          <a:p>
-            <a:r>
-              <a:rPr lang="en-US" dirty="0"/>
-              <a:t>// </a:t>
-            </a:r>
-            <a:r>
-              <a:rPr lang="en-US" dirty="0" err="1"/>
-              <a:t>indeedDB</a:t>
-            </a:r>
-            <a:r>
-              <a:rPr lang="en-US" dirty="0"/>
-              <a:t> is the database</a:t>
-            </a:r>
-          </a:p>
-          <a:p>
-            <a:r>
-              <a:rPr lang="en-US" dirty="0"/>
-              <a:t>// @</a:t>
-            </a:r>
-            <a:r>
-              <a:rPr lang="en-US" dirty="0" err="1"/>
-              <a:t>app.route</a:t>
-            </a:r>
-            <a:r>
-              <a:rPr lang="en-US" dirty="0"/>
-              <a:t> runs the function for the </a:t>
-            </a:r>
-            <a:r>
-              <a:rPr lang="en-US" dirty="0" err="1"/>
-              <a:t>url</a:t>
-            </a:r>
-            <a:endParaRPr lang="en-US" dirty="0"/>
-          </a:p>
-          <a:p>
-            <a:r>
-              <a:rPr lang="en-US" dirty="0"/>
-              <a:t>// checks the query, gets results, puts the results to the </a:t>
-            </a:r>
-            <a:r>
-              <a:rPr lang="en-US" dirty="0" err="1"/>
-              <a:t>db</a:t>
-            </a:r>
-            <a:r>
-              <a:rPr lang="en-US" dirty="0"/>
-              <a:t>, then pulls the results; once it has the result </a:t>
-            </a:r>
-            <a:r>
-              <a:rPr lang="en-US" dirty="0" err="1"/>
-              <a:t>varibalbes</a:t>
-            </a:r>
-            <a:r>
-              <a:rPr lang="en-US" dirty="0"/>
-              <a:t> it's going to put it in the </a:t>
-            </a:r>
-            <a:r>
-              <a:rPr lang="en-US" dirty="0" err="1"/>
-              <a:t>render_template</a:t>
-            </a:r>
-            <a:endParaRPr lang="en-US" dirty="0"/>
-          </a:p>
-          <a:p>
-            <a:br>
-              <a:rPr lang="en-US" dirty="0"/>
-            </a:br>
-            <a:r>
-              <a:rPr lang="en-US" dirty="0"/>
-              <a:t>// reload page go to the page</a:t>
-            </a:r>
-          </a:p>
-          <a:p>
-            <a:r>
-              <a:rPr lang="en-US" dirty="0"/>
-              <a:t>// grab parameters from text boxes</a:t>
-            </a:r>
-          </a:p>
-          <a:p>
-            <a:r>
-              <a:rPr lang="en-US" dirty="0"/>
-              <a:t>// </a:t>
-            </a:r>
-            <a:r>
-              <a:rPr lang="en-US" dirty="0" err="1"/>
-              <a:t>searchs</a:t>
-            </a:r>
-            <a:r>
-              <a:rPr lang="en-US" dirty="0"/>
-              <a:t> those parameters; query with those parameters (this returns the jobs)</a:t>
-            </a:r>
-          </a:p>
-          <a:p>
-            <a:r>
-              <a:rPr lang="en-US" dirty="0"/>
-              <a:t>// gets jobs from the query</a:t>
-            </a:r>
-          </a:p>
-          <a:p>
-            <a:r>
-              <a:rPr lang="en-US" dirty="0"/>
-              <a:t>// jobs to DB, jobs from database</a:t>
-            </a:r>
-          </a:p>
-          <a:p>
-            <a:r>
-              <a:rPr lang="en-US" dirty="0"/>
-              <a:t>// now we have the jobs from the </a:t>
-            </a:r>
-            <a:r>
-              <a:rPr lang="en-US" dirty="0" err="1"/>
-              <a:t>db</a:t>
-            </a:r>
-            <a:endParaRPr lang="en-US" dirty="0"/>
-          </a:p>
-          <a:p>
-            <a:r>
-              <a:rPr lang="en-US" dirty="0"/>
-              <a:t>// next flask will render the html at your localhost (lets you enter textbox params and data)</a:t>
-            </a:r>
-          </a:p>
-          <a:p>
-            <a:br>
-              <a:rPr lang="en-US" dirty="0"/>
-            </a:br>
-            <a:r>
-              <a:rPr lang="en-US" dirty="0"/>
-              <a:t>// file.js (this is the michelle.js)</a:t>
-            </a:r>
-          </a:p>
-          <a:p>
-            <a:r>
-              <a:rPr lang="en-US" dirty="0"/>
-              <a:t>// select html tag with the data that is the d3.select('#</a:t>
-            </a:r>
-            <a:r>
-              <a:rPr lang="en-US" dirty="0" err="1"/>
-              <a:t>dataScript</a:t>
-            </a:r>
-            <a:r>
-              <a:rPr lang="en-US" dirty="0"/>
-              <a:t>')</a:t>
-            </a:r>
-          </a:p>
-          <a:p>
-            <a:r>
-              <a:rPr lang="en-US" dirty="0"/>
-              <a:t>// next you get the tag .</a:t>
-            </a:r>
-            <a:r>
-              <a:rPr lang="en-US" dirty="0" err="1"/>
-              <a:t>attr</a:t>
-            </a:r>
-            <a:r>
-              <a:rPr lang="en-US" dirty="0"/>
-              <a:t>('</a:t>
-            </a:r>
-            <a:r>
-              <a:rPr lang="en-US" dirty="0" err="1"/>
-              <a:t>indata</a:t>
-            </a:r>
-            <a:r>
-              <a:rPr lang="en-US" dirty="0"/>
-              <a:t>)</a:t>
-            </a:r>
-          </a:p>
-          <a:p>
-            <a:r>
-              <a:rPr lang="en-US" dirty="0"/>
-              <a:t>// make data json type by the [</a:t>
-            </a:r>
-            <a:r>
-              <a:rPr lang="en-US" dirty="0" err="1"/>
-              <a:t>JSON.parse</a:t>
-            </a:r>
-            <a:r>
-              <a:rPr lang="en-US" dirty="0"/>
-              <a:t>()]</a:t>
-            </a:r>
-          </a:p>
-          <a:p>
-            <a:r>
-              <a:rPr lang="en-US" dirty="0"/>
-              <a:t>// d3.select(#</a:t>
-            </a:r>
-            <a:r>
-              <a:rPr lang="en-US" dirty="0" err="1"/>
-              <a:t>michelle</a:t>
-            </a:r>
-            <a:r>
-              <a:rPr lang="en-US" dirty="0"/>
-              <a:t>), this will call div id which is where I will put the graph inside it.</a:t>
-            </a:r>
-          </a:p>
-          <a:p>
-            <a:r>
-              <a:rPr lang="en-US" dirty="0"/>
-              <a:t>// map in d</a:t>
-            </a:r>
-          </a:p>
-          <a:p>
-            <a:r>
-              <a:rPr lang="en-US" dirty="0"/>
-              <a:t>// use </a:t>
-            </a:r>
-            <a:r>
-              <a:rPr lang="en-US" dirty="0" err="1"/>
-              <a:t>Javascript</a:t>
-            </a:r>
-            <a:r>
-              <a:rPr lang="en-US" dirty="0"/>
-              <a:t> to create the graphs var </a:t>
-            </a:r>
-            <a:r>
-              <a:rPr lang="en-US" dirty="0" err="1"/>
-              <a:t>michllesTag</a:t>
-            </a:r>
-            <a:r>
-              <a:rPr lang="en-US" dirty="0"/>
-              <a:t> = d3.select('#</a:t>
-            </a:r>
-            <a:r>
-              <a:rPr lang="en-US" dirty="0" err="1"/>
-              <a:t>michelle</a:t>
-            </a:r>
-            <a:r>
-              <a:rPr lang="en-US" dirty="0"/>
-              <a:t>')</a:t>
-            </a:r>
-          </a:p>
-          <a:p>
-            <a:r>
-              <a:rPr lang="en-US" dirty="0"/>
-              <a:t>// make visual with data</a:t>
-            </a:r>
-          </a:p>
-          <a:p>
-            <a:r>
-              <a:rPr lang="en-US" dirty="0"/>
-              <a:t>// append visual to div go into d3 </a:t>
-            </a:r>
-            <a:r>
-              <a:rPr lang="en-US" dirty="0" err="1"/>
-              <a:t>challeng</a:t>
-            </a:r>
-            <a:r>
-              <a:rPr lang="en-US" dirty="0"/>
-              <a:t> ; </a:t>
-            </a:r>
-            <a:r>
-              <a:rPr lang="en-US" dirty="0" err="1"/>
-              <a:t>javascript</a:t>
-            </a:r>
-            <a:r>
-              <a:rPr lang="en-US" dirty="0"/>
-              <a:t> file in the d3 challenge</a:t>
-            </a:r>
-          </a:p>
-          <a:p>
-            <a:endParaRPr lang="en-US" dirty="0"/>
-          </a:p>
-        </p:txBody>
-      </p:sp>
-      <p:sp>
-        <p:nvSpPr>
-          <p:cNvPr id="4" name="Slide Number Placeholder 3">
-            <a:extLst>
-              <a:ext uri="{FF2B5EF4-FFF2-40B4-BE49-F238E27FC236}">
-                <a16:creationId xmlns:a16="http://schemas.microsoft.com/office/drawing/2014/main" id="{BA180527-5886-4F4F-95E2-7F0A1C40DF9F}"/>
-              </a:ext>
-            </a:extLst>
-          </p:cNvPr>
-          <p:cNvSpPr>
-            <a:spLocks noGrp="1"/>
-          </p:cNvSpPr>
-          <p:nvPr>
-            <p:ph type="sldNum" sz="quarter" idx="12"/>
-          </p:nvPr>
-        </p:nvSpPr>
-        <p:spPr/>
-        <p:txBody>
-          <a:bodyPr/>
-          <a:lstStyle/>
-          <a:p>
-            <a:fld id="{106E12CD-FCB1-464E-A775-0B83FDDACE03}" type="slidenum">
-              <a:rPr lang="en-US" smtClean="0"/>
-              <a:pPr/>
-              <a:t>13</a:t>
-            </a:fld>
-            <a:endParaRPr lang="en-US"/>
-          </a:p>
-        </p:txBody>
-      </p:sp>
-    </p:spTree>
-    <p:extLst>
-      <p:ext uri="{BB962C8B-B14F-4D97-AF65-F5344CB8AC3E}">
-        <p14:creationId xmlns:p14="http://schemas.microsoft.com/office/powerpoint/2010/main" val="2868764917"/>
       </p:ext>
     </p:extLst>
   </p:cSld>
@@ -6425,13 +5264,13 @@
           <a:p>
             <a:r>
               <a:rPr lang="en-US" sz="1600" dirty="0"/>
-              <a:t>Running out of our API data</a:t>
+              <a:t>Running out of our API data, exceeding our daily limit</a:t>
             </a:r>
           </a:p>
           <a:p>
             <a:r>
               <a:rPr lang="en-US" sz="1600" dirty="0"/>
-              <a:t>Getting good data from the API; Less than 5% had salary</a:t>
+              <a:t>Getting good data from the API; Less than 5% had salary data</a:t>
             </a:r>
           </a:p>
         </p:txBody>
@@ -6676,80 +5515,43 @@
           <a:p>
             <a:r>
               <a:rPr lang="en-US" dirty="0"/>
-              <a:t>Provide users an interactive means to explore data</a:t>
-            </a:r>
-          </a:p>
-        </p:txBody>
-      </p:sp>
-      <p:sp>
-        <p:nvSpPr>
-          <p:cNvPr id="3" name="Text Placeholder 2">
+              <a:t>The web page provides users an interactive means to explore data</a:t>
+            </a:r>
+          </a:p>
+        </p:txBody>
+      </p:sp>
+      <p:pic>
+        <p:nvPicPr>
+          <p:cNvPr id="5" name="Content Placeholder 4">
             <a:extLst>
               <a:ext uri="{FF2B5EF4-FFF2-40B4-BE49-F238E27FC236}">
-                <a16:creationId xmlns:a16="http://schemas.microsoft.com/office/drawing/2014/main" id="{1B71631B-FC55-44C4-B49D-B199C170F42D}"/>
+                <a16:creationId xmlns:a16="http://schemas.microsoft.com/office/drawing/2014/main" id="{77C91CD4-DCEE-45FE-84CA-D7E3494E8109}"/>
               </a:ext>
             </a:extLst>
           </p:cNvPr>
-          <p:cNvSpPr>
-            <a:spLocks noGrp="1"/>
-          </p:cNvSpPr>
-          <p:nvPr>
-            <p:ph type="body" idx="1"/>
-          </p:nvPr>
-        </p:nvSpPr>
+          <p:cNvPicPr>
+            <a:picLocks noGrp="1" noChangeAspect="1"/>
+          </p:cNvPicPr>
+          <p:nvPr>
+            <p:ph sz="half" idx="2"/>
+          </p:nvPr>
+        </p:nvPicPr>
+        <p:blipFill>
+          <a:blip r:embed="rId2"/>
+          <a:stretch>
+            <a:fillRect/>
+          </a:stretch>
+        </p:blipFill>
         <p:spPr>
           <a:xfrm>
-            <a:off x="457200" y="1151335"/>
-            <a:ext cx="7755308" cy="479822"/>
+            <a:off x="457200" y="2854678"/>
+            <a:ext cx="4393896" cy="1682931"/>
           </a:xfrm>
+          <a:prstGeom prst="rect">
+            <a:avLst/>
+          </a:prstGeom>
         </p:spPr>
-        <p:txBody>
-          <a:bodyPr/>
-          <a:lstStyle/>
-          <a:p>
-            <a:r>
-              <a:rPr lang="en-US" dirty="0"/>
-              <a:t>Add screen shots of main screen and search capability</a:t>
-            </a:r>
-          </a:p>
-        </p:txBody>
-      </p:sp>
-      <p:sp>
-        <p:nvSpPr>
-          <p:cNvPr id="4" name="Content Placeholder 3">
-            <a:extLst>
-              <a:ext uri="{FF2B5EF4-FFF2-40B4-BE49-F238E27FC236}">
-                <a16:creationId xmlns:a16="http://schemas.microsoft.com/office/drawing/2014/main" id="{58EF3C7F-55D2-44CE-9522-7E79BEDC6FE1}"/>
-              </a:ext>
-            </a:extLst>
-          </p:cNvPr>
-          <p:cNvSpPr>
-            <a:spLocks noGrp="1"/>
-          </p:cNvSpPr>
-          <p:nvPr>
-            <p:ph sz="half" idx="2"/>
-          </p:nvPr>
-        </p:nvSpPr>
-        <p:spPr>
-          <a:xfrm>
-            <a:off x="457200" y="1631156"/>
-            <a:ext cx="7755308" cy="2963466"/>
-          </a:xfrm>
-        </p:spPr>
-        <p:txBody>
-          <a:bodyPr/>
-          <a:lstStyle/>
-          <a:p>
-            <a:r>
-              <a:rPr lang="en-US" dirty="0"/>
-              <a:t>Your project must include some level of user-driven interaction (e.g., menus, dropdowns, textboxes). </a:t>
-            </a:r>
-          </a:p>
-          <a:p>
-            <a:endParaRPr lang="en-US" dirty="0"/>
-          </a:p>
-        </p:txBody>
-      </p:sp>
+      </p:pic>
       <p:sp>
         <p:nvSpPr>
           <p:cNvPr id="7" name="Slide Number Placeholder 6">
@@ -6776,6 +5578,210 @@
               <a:pPr/>
               <a:t>4</a:t>
             </a:fld>
+            <a:endParaRPr lang="en-US"/>
+          </a:p>
+        </p:txBody>
+      </p:sp>
+      <p:pic>
+        <p:nvPicPr>
+          <p:cNvPr id="6" name="Picture 5">
+            <a:extLst>
+              <a:ext uri="{FF2B5EF4-FFF2-40B4-BE49-F238E27FC236}">
+                <a16:creationId xmlns:a16="http://schemas.microsoft.com/office/drawing/2014/main" id="{92B7E206-CA37-44BA-A40A-5D664F54E470}"/>
+              </a:ext>
+            </a:extLst>
+          </p:cNvPr>
+          <p:cNvPicPr>
+            <a:picLocks noChangeAspect="1"/>
+          </p:cNvPicPr>
+          <p:nvPr/>
+        </p:nvPicPr>
+        <p:blipFill>
+          <a:blip r:embed="rId3"/>
+          <a:stretch>
+            <a:fillRect/>
+          </a:stretch>
+        </p:blipFill>
+        <p:spPr>
+          <a:xfrm>
+            <a:off x="5252224" y="2185459"/>
+            <a:ext cx="3810927" cy="2390012"/>
+          </a:xfrm>
+          <a:prstGeom prst="rect">
+            <a:avLst/>
+          </a:prstGeom>
+        </p:spPr>
+      </p:pic>
+      <p:sp>
+        <p:nvSpPr>
+          <p:cNvPr id="8" name="TextBox 7">
+            <a:extLst>
+              <a:ext uri="{FF2B5EF4-FFF2-40B4-BE49-F238E27FC236}">
+                <a16:creationId xmlns:a16="http://schemas.microsoft.com/office/drawing/2014/main" id="{97B087B6-6CBE-49DA-9EB4-EC4577BF63E4}"/>
+              </a:ext>
+            </a:extLst>
+          </p:cNvPr>
+          <p:cNvSpPr txBox="1"/>
+          <p:nvPr/>
+        </p:nvSpPr>
+        <p:spPr>
+          <a:xfrm>
+            <a:off x="311921" y="1327631"/>
+            <a:ext cx="4393896" cy="923330"/>
+          </a:xfrm>
+          <a:prstGeom prst="rect">
+            <a:avLst/>
+          </a:prstGeom>
+          <a:noFill/>
+          <a:ln>
+            <a:solidFill>
+              <a:schemeClr val="tx1"/>
+            </a:solidFill>
+          </a:ln>
+        </p:spPr>
+        <p:txBody>
+          <a:bodyPr wrap="square" rtlCol="0">
+            <a:spAutoFit/>
+          </a:bodyPr>
+          <a:lstStyle/>
+          <a:p>
+            <a:r>
+              <a:rPr lang="en-US" dirty="0"/>
+              <a:t>Select the Job Type, location and distance to the </a:t>
+            </a:r>
+          </a:p>
+          <a:p>
+            <a:r>
+              <a:rPr lang="en-US" dirty="0"/>
+              <a:t>Location.  Click search</a:t>
+            </a:r>
+          </a:p>
+        </p:txBody>
+      </p:sp>
+      <p:sp>
+        <p:nvSpPr>
+          <p:cNvPr id="9" name="Arrow: Down 8">
+            <a:extLst>
+              <a:ext uri="{FF2B5EF4-FFF2-40B4-BE49-F238E27FC236}">
+                <a16:creationId xmlns:a16="http://schemas.microsoft.com/office/drawing/2014/main" id="{8F30FE7D-7E71-4D68-89AD-3DF2BBFE1955}"/>
+              </a:ext>
+            </a:extLst>
+          </p:cNvPr>
+          <p:cNvSpPr/>
+          <p:nvPr/>
+        </p:nvSpPr>
+        <p:spPr>
+          <a:xfrm>
+            <a:off x="2508869" y="2185459"/>
+            <a:ext cx="290558" cy="646331"/>
+          </a:xfrm>
+          <a:prstGeom prst="downArrow">
+            <a:avLst/>
+          </a:prstGeom>
+        </p:spPr>
+        <p:style>
+          <a:lnRef idx="1">
+            <a:schemeClr val="accent1"/>
+          </a:lnRef>
+          <a:fillRef idx="3">
+            <a:schemeClr val="accent1"/>
+          </a:fillRef>
+          <a:effectRef idx="2">
+            <a:schemeClr val="accent1"/>
+          </a:effectRef>
+          <a:fontRef idx="minor">
+            <a:schemeClr val="lt1"/>
+          </a:fontRef>
+        </p:style>
+        <p:txBody>
+          <a:bodyPr rtlCol="0" anchor="ctr"/>
+          <a:lstStyle/>
+          <a:p>
+            <a:pPr algn="ctr"/>
+            <a:endParaRPr lang="en-US"/>
+          </a:p>
+        </p:txBody>
+      </p:sp>
+      <p:sp>
+        <p:nvSpPr>
+          <p:cNvPr id="10" name="TextBox 9">
+            <a:extLst>
+              <a:ext uri="{FF2B5EF4-FFF2-40B4-BE49-F238E27FC236}">
+                <a16:creationId xmlns:a16="http://schemas.microsoft.com/office/drawing/2014/main" id="{D45812B4-C4E5-4C4A-9F9D-54F6D72ADC02}"/>
+              </a:ext>
+            </a:extLst>
+          </p:cNvPr>
+          <p:cNvSpPr txBox="1"/>
+          <p:nvPr/>
+        </p:nvSpPr>
+        <p:spPr>
+          <a:xfrm>
+            <a:off x="5207399" y="1301178"/>
+            <a:ext cx="3810927" cy="646331"/>
+          </a:xfrm>
+          <a:prstGeom prst="rect">
+            <a:avLst/>
+          </a:prstGeom>
+          <a:noFill/>
+          <a:ln>
+            <a:solidFill>
+              <a:schemeClr val="tx1"/>
+            </a:solidFill>
+          </a:ln>
+        </p:spPr>
+        <p:txBody>
+          <a:bodyPr wrap="square" rtlCol="0">
+            <a:spAutoFit/>
+          </a:bodyPr>
+          <a:lstStyle/>
+          <a:p>
+            <a:r>
+              <a:rPr lang="en-US" dirty="0"/>
+              <a:t>Zoom in and out of the map for the locations of the available jobs</a:t>
+            </a:r>
+          </a:p>
+        </p:txBody>
+      </p:sp>
+      <p:sp>
+        <p:nvSpPr>
+          <p:cNvPr id="11" name="Arrow: Down 10">
+            <a:extLst>
+              <a:ext uri="{FF2B5EF4-FFF2-40B4-BE49-F238E27FC236}">
+                <a16:creationId xmlns:a16="http://schemas.microsoft.com/office/drawing/2014/main" id="{283E40DE-C77C-4539-93B9-1F826CD59E69}"/>
+              </a:ext>
+            </a:extLst>
+          </p:cNvPr>
+          <p:cNvSpPr/>
+          <p:nvPr/>
+        </p:nvSpPr>
+        <p:spPr>
+          <a:xfrm>
+            <a:off x="6902765" y="1927795"/>
+            <a:ext cx="290558" cy="646331"/>
+          </a:xfrm>
+          <a:prstGeom prst="downArrow">
+            <a:avLst/>
+          </a:prstGeom>
+        </p:spPr>
+        <p:style>
+          <a:lnRef idx="1">
+            <a:schemeClr val="accent1"/>
+          </a:lnRef>
+          <a:fillRef idx="3">
+            <a:schemeClr val="accent1"/>
+          </a:fillRef>
+          <a:effectRef idx="2">
+            <a:schemeClr val="accent1"/>
+          </a:effectRef>
+          <a:fontRef idx="minor">
+            <a:schemeClr val="lt1"/>
+          </a:fontRef>
+        </p:style>
+        <p:txBody>
+          <a:bodyPr rtlCol="0" anchor="ctr"/>
+          <a:lstStyle/>
+          <a:p>
+            <a:pPr algn="ctr"/>
             <a:endParaRPr lang="en-US"/>
           </a:p>
         </p:txBody>
@@ -6835,40 +5841,7 @@
           <a:p>
             <a:r>
               <a:rPr lang="en-US" sz="4000" dirty="0"/>
-              <a:t>Use flask Python to pull data</a:t>
-            </a:r>
-          </a:p>
-        </p:txBody>
-      </p:sp>
-      <p:sp>
-        <p:nvSpPr>
-          <p:cNvPr id="3" name="Text Placeholder 2">
-            <a:extLst>
-              <a:ext uri="{FF2B5EF4-FFF2-40B4-BE49-F238E27FC236}">
-                <a16:creationId xmlns:a16="http://schemas.microsoft.com/office/drawing/2014/main" id="{1B71631B-FC55-44C4-B49D-B199C170F42D}"/>
-              </a:ext>
-            </a:extLst>
-          </p:cNvPr>
-          <p:cNvSpPr>
-            <a:spLocks noGrp="1"/>
-          </p:cNvSpPr>
-          <p:nvPr>
-            <p:ph type="body" idx="1"/>
-          </p:nvPr>
-        </p:nvSpPr>
-        <p:spPr>
-          <a:xfrm>
-            <a:off x="457200" y="1151335"/>
-            <a:ext cx="7755308" cy="479822"/>
-          </a:xfrm>
-        </p:spPr>
-        <p:txBody>
-          <a:bodyPr/>
-          <a:lstStyle/>
-          <a:p>
-            <a:r>
-              <a:rPr lang="en-US" dirty="0"/>
-              <a:t>Add screen shot</a:t>
+              <a:t>Used flask Python to pull data</a:t>
             </a:r>
           </a:p>
         </p:txBody>
@@ -6899,29 +5872,9 @@
           <a:bodyPr/>
           <a:lstStyle/>
           <a:p>
-            <a:r>
-              <a:rPr lang="en-US" dirty="0"/>
-              <a:t>Python Flask–powered API, HTML/CSS, JavaScript, and at least one database (SQL, MongoDB, SQLite, etc.).</a:t>
-            </a:r>
-          </a:p>
-          <a:p>
-            <a:r>
-              <a:rPr lang="en-US" dirty="0"/>
-              <a:t>A combination of web scraping and Leaflet or </a:t>
-            </a:r>
-            <a:r>
-              <a:rPr lang="en-US" dirty="0" err="1"/>
-              <a:t>Plotly</a:t>
-            </a:r>
-            <a:endParaRPr lang="en-US" dirty="0"/>
-          </a:p>
-          <a:p>
-            <a:r>
-              <a:rPr lang="en-US" dirty="0"/>
-              <a:t>Your project must be powered by a data set with at least 100 records. </a:t>
-            </a:r>
-          </a:p>
-          <a:p>
+            <a:pPr marL="0" indent="0">
+              <a:buNone/>
+            </a:pPr>
             <a:r>
               <a:rPr lang="en-US" dirty="0"/>
               <a:t> </a:t>
@@ -6958,6 +5911,155 @@
               <a:pPr/>
               <a:t>5</a:t>
             </a:fld>
+            <a:endParaRPr lang="en-US"/>
+          </a:p>
+        </p:txBody>
+      </p:sp>
+      <p:pic>
+        <p:nvPicPr>
+          <p:cNvPr id="6" name="Content Placeholder 7">
+            <a:extLst>
+              <a:ext uri="{FF2B5EF4-FFF2-40B4-BE49-F238E27FC236}">
+                <a16:creationId xmlns:a16="http://schemas.microsoft.com/office/drawing/2014/main" id="{D2B83B54-F682-4CC0-AE2D-271CADEB765E}"/>
+              </a:ext>
+            </a:extLst>
+          </p:cNvPr>
+          <p:cNvPicPr>
+            <a:picLocks noChangeAspect="1"/>
+          </p:cNvPicPr>
+          <p:nvPr/>
+        </p:nvPicPr>
+        <p:blipFill>
+          <a:blip r:embed="rId2"/>
+          <a:stretch>
+            <a:fillRect/>
+          </a:stretch>
+        </p:blipFill>
+        <p:spPr>
+          <a:xfrm>
+            <a:off x="325334" y="1182029"/>
+            <a:ext cx="5076028" cy="3512742"/>
+          </a:xfrm>
+          <a:prstGeom prst="rect">
+            <a:avLst/>
+          </a:prstGeom>
+        </p:spPr>
+      </p:pic>
+      <p:pic>
+        <p:nvPicPr>
+          <p:cNvPr id="9" name="Content Placeholder 7">
+            <a:extLst>
+              <a:ext uri="{FF2B5EF4-FFF2-40B4-BE49-F238E27FC236}">
+                <a16:creationId xmlns:a16="http://schemas.microsoft.com/office/drawing/2014/main" id="{D88EDEF0-99E4-42D4-A00C-6194895CAB62}"/>
+              </a:ext>
+            </a:extLst>
+          </p:cNvPr>
+          <p:cNvPicPr>
+            <a:picLocks noChangeAspect="1"/>
+          </p:cNvPicPr>
+          <p:nvPr/>
+        </p:nvPicPr>
+        <p:blipFill>
+          <a:blip r:embed="rId3"/>
+          <a:stretch>
+            <a:fillRect/>
+          </a:stretch>
+        </p:blipFill>
+        <p:spPr>
+          <a:xfrm>
+            <a:off x="5609063" y="2177338"/>
+            <a:ext cx="3209603" cy="2517433"/>
+          </a:xfrm>
+          <a:prstGeom prst="rect">
+            <a:avLst/>
+          </a:prstGeom>
+          <a:ln>
+            <a:solidFill>
+              <a:schemeClr val="tx1"/>
+            </a:solidFill>
+          </a:ln>
+        </p:spPr>
+      </p:pic>
+      <p:sp>
+        <p:nvSpPr>
+          <p:cNvPr id="10" name="TextBox 9">
+            <a:extLst>
+              <a:ext uri="{FF2B5EF4-FFF2-40B4-BE49-F238E27FC236}">
+                <a16:creationId xmlns:a16="http://schemas.microsoft.com/office/drawing/2014/main" id="{7FDEED24-4FB2-4B07-ADDA-5CA2E3F40598}"/>
+              </a:ext>
+            </a:extLst>
+          </p:cNvPr>
+          <p:cNvSpPr txBox="1"/>
+          <p:nvPr/>
+        </p:nvSpPr>
+        <p:spPr>
+          <a:xfrm>
+            <a:off x="5447350" y="1077246"/>
+            <a:ext cx="3371316" cy="646331"/>
+          </a:xfrm>
+          <a:prstGeom prst="rect">
+            <a:avLst/>
+          </a:prstGeom>
+          <a:noFill/>
+          <a:ln>
+            <a:solidFill>
+              <a:schemeClr val="tx1"/>
+            </a:solidFill>
+          </a:ln>
+        </p:spPr>
+        <p:txBody>
+          <a:bodyPr wrap="square" rtlCol="0">
+            <a:spAutoFit/>
+          </a:bodyPr>
+          <a:lstStyle/>
+          <a:p>
+            <a:r>
+              <a:rPr lang="en-US" dirty="0"/>
+              <a:t>Flask returned all the jobs for that  job, location and radius</a:t>
+            </a:r>
+          </a:p>
+        </p:txBody>
+      </p:sp>
+      <p:sp>
+        <p:nvSpPr>
+          <p:cNvPr id="11" name="Arrow: Down 10">
+            <a:extLst>
+              <a:ext uri="{FF2B5EF4-FFF2-40B4-BE49-F238E27FC236}">
+                <a16:creationId xmlns:a16="http://schemas.microsoft.com/office/drawing/2014/main" id="{0D82D5DD-2909-4FDB-A34E-89DFACDA2BBA}"/>
+              </a:ext>
+            </a:extLst>
+          </p:cNvPr>
+          <p:cNvSpPr/>
+          <p:nvPr/>
+        </p:nvSpPr>
+        <p:spPr>
+          <a:xfrm>
+            <a:off x="7154856" y="1676129"/>
+            <a:ext cx="290558" cy="646331"/>
+          </a:xfrm>
+          <a:prstGeom prst="downArrow">
+            <a:avLst/>
+          </a:prstGeom>
+        </p:spPr>
+        <p:style>
+          <a:lnRef idx="1">
+            <a:schemeClr val="accent1"/>
+          </a:lnRef>
+          <a:fillRef idx="3">
+            <a:schemeClr val="accent1"/>
+          </a:fillRef>
+          <a:effectRef idx="2">
+            <a:schemeClr val="accent1"/>
+          </a:effectRef>
+          <a:fontRef idx="minor">
+            <a:schemeClr val="lt1"/>
+          </a:fontRef>
+        </p:style>
+        <p:txBody>
+          <a:bodyPr rtlCol="0" anchor="ctr"/>
+          <a:lstStyle/>
+          <a:p>
+            <a:pPr algn="ctr"/>
             <a:endParaRPr lang="en-US"/>
           </a:p>
         </p:txBody>
@@ -6997,7 +6099,7 @@
           <p:cNvPr id="2" name="Title 1">
             <a:extLst>
               <a:ext uri="{FF2B5EF4-FFF2-40B4-BE49-F238E27FC236}">
-                <a16:creationId xmlns:a16="http://schemas.microsoft.com/office/drawing/2014/main" id="{5E4FF44B-902C-46C0-8AD0-13C60C73415A}"/>
+                <a16:creationId xmlns:a16="http://schemas.microsoft.com/office/drawing/2014/main" id="{E5231849-7978-485C-A8D7-CBC894E507B2}"/>
               </a:ext>
             </a:extLst>
           </p:cNvPr>
@@ -7016,74 +6118,8 @@
           <a:lstStyle/>
           <a:p>
             <a:r>
-              <a:rPr lang="en-US" sz="4000" dirty="0"/>
-              <a:t>A dashboard page with multiple charts that update from the same data </a:t>
-            </a:r>
-          </a:p>
-        </p:txBody>
-      </p:sp>
-      <p:sp>
-        <p:nvSpPr>
-          <p:cNvPr id="3" name="Text Placeholder 2">
-            <a:extLst>
-              <a:ext uri="{FF2B5EF4-FFF2-40B4-BE49-F238E27FC236}">
-                <a16:creationId xmlns:a16="http://schemas.microsoft.com/office/drawing/2014/main" id="{1B71631B-FC55-44C4-B49D-B199C170F42D}"/>
-              </a:ext>
-            </a:extLst>
-          </p:cNvPr>
-          <p:cNvSpPr>
-            <a:spLocks noGrp="1"/>
-          </p:cNvSpPr>
-          <p:nvPr>
-            <p:ph type="body" idx="1"/>
-          </p:nvPr>
-        </p:nvSpPr>
-        <p:spPr>
-          <a:xfrm>
-            <a:off x="457200" y="1151335"/>
-            <a:ext cx="7755308" cy="479822"/>
-          </a:xfrm>
-        </p:spPr>
-        <p:txBody>
-          <a:bodyPr/>
-          <a:lstStyle/>
-          <a:p>
-            <a:r>
               <a:rPr lang="en-US" dirty="0"/>
-              <a:t>Add screen shot</a:t>
-            </a:r>
-          </a:p>
-        </p:txBody>
-      </p:sp>
-      <p:sp>
-        <p:nvSpPr>
-          <p:cNvPr id="4" name="Content Placeholder 3">
-            <a:extLst>
-              <a:ext uri="{FF2B5EF4-FFF2-40B4-BE49-F238E27FC236}">
-                <a16:creationId xmlns:a16="http://schemas.microsoft.com/office/drawing/2014/main" id="{58EF3C7F-55D2-44CE-9522-7E79BEDC6FE1}"/>
-              </a:ext>
-            </a:extLst>
-          </p:cNvPr>
-          <p:cNvSpPr>
-            <a:spLocks noGrp="1"/>
-          </p:cNvSpPr>
-          <p:nvPr>
-            <p:ph sz="half" idx="2"/>
-          </p:nvPr>
-        </p:nvSpPr>
-        <p:spPr>
-          <a:xfrm>
-            <a:off x="457200" y="1631156"/>
-            <a:ext cx="7755308" cy="2963466"/>
-          </a:xfrm>
-        </p:spPr>
-        <p:txBody>
-          <a:bodyPr/>
-          <a:lstStyle/>
-          <a:p>
-            <a:r>
-              <a:rPr lang="en-US" dirty="0"/>
-              <a:t>one JS library that we did not cover.</a:t>
+              <a:t>Based on the search criteria, several questions are answered</a:t>
             </a:r>
           </a:p>
         </p:txBody>
@@ -7093,7 +6129,7 @@
           <p:cNvPr id="7" name="Slide Number Placeholder 6">
             <a:extLst>
               <a:ext uri="{FF2B5EF4-FFF2-40B4-BE49-F238E27FC236}">
-                <a16:creationId xmlns:a16="http://schemas.microsoft.com/office/drawing/2014/main" id="{478DCDE6-FD8C-4F2D-B633-DBA7C009BDE8}"/>
+                <a16:creationId xmlns:a16="http://schemas.microsoft.com/office/drawing/2014/main" id="{0F7BF415-C94B-479F-B943-3DCDD0AC17A7}"/>
               </a:ext>
             </a:extLst>
           </p:cNvPr>
@@ -7118,10 +6154,367 @@
           </a:p>
         </p:txBody>
       </p:sp>
+      <p:pic>
+        <p:nvPicPr>
+          <p:cNvPr id="9" name="Picture 8">
+            <a:extLst>
+              <a:ext uri="{FF2B5EF4-FFF2-40B4-BE49-F238E27FC236}">
+                <a16:creationId xmlns:a16="http://schemas.microsoft.com/office/drawing/2014/main" id="{2DA4FD5E-16C7-4B47-A9B9-F641538F3331}"/>
+              </a:ext>
+            </a:extLst>
+          </p:cNvPr>
+          <p:cNvPicPr>
+            <a:picLocks noChangeAspect="1"/>
+          </p:cNvPicPr>
+          <p:nvPr/>
+        </p:nvPicPr>
+        <p:blipFill>
+          <a:blip r:embed="rId2"/>
+          <a:stretch>
+            <a:fillRect/>
+          </a:stretch>
+        </p:blipFill>
+        <p:spPr>
+          <a:xfrm>
+            <a:off x="4572000" y="3340306"/>
+            <a:ext cx="4051972" cy="1378477"/>
+          </a:xfrm>
+          <a:prstGeom prst="rect">
+            <a:avLst/>
+          </a:prstGeom>
+          <a:ln>
+            <a:solidFill>
+              <a:schemeClr val="tx1"/>
+            </a:solidFill>
+          </a:ln>
+        </p:spPr>
+      </p:pic>
+      <p:pic>
+        <p:nvPicPr>
+          <p:cNvPr id="12" name="Picture 11">
+            <a:extLst>
+              <a:ext uri="{FF2B5EF4-FFF2-40B4-BE49-F238E27FC236}">
+                <a16:creationId xmlns:a16="http://schemas.microsoft.com/office/drawing/2014/main" id="{C3CC17EB-B9F9-4975-B815-748A377708AC}"/>
+              </a:ext>
+            </a:extLst>
+          </p:cNvPr>
+          <p:cNvPicPr>
+            <a:picLocks noChangeAspect="1"/>
+          </p:cNvPicPr>
+          <p:nvPr/>
+        </p:nvPicPr>
+        <p:blipFill>
+          <a:blip r:embed="rId3"/>
+          <a:stretch>
+            <a:fillRect/>
+          </a:stretch>
+        </p:blipFill>
+        <p:spPr>
+          <a:xfrm>
+            <a:off x="331751" y="1993885"/>
+            <a:ext cx="3371316" cy="1734061"/>
+          </a:xfrm>
+          <a:prstGeom prst="rect">
+            <a:avLst/>
+          </a:prstGeom>
+          <a:ln>
+            <a:solidFill>
+              <a:schemeClr val="tx1"/>
+            </a:solidFill>
+          </a:ln>
+        </p:spPr>
+      </p:pic>
+      <p:sp>
+        <p:nvSpPr>
+          <p:cNvPr id="13" name="TextBox 12">
+            <a:extLst>
+              <a:ext uri="{FF2B5EF4-FFF2-40B4-BE49-F238E27FC236}">
+                <a16:creationId xmlns:a16="http://schemas.microsoft.com/office/drawing/2014/main" id="{5B7D7A75-F148-44B6-BFA4-FD8D7557F31E}"/>
+              </a:ext>
+            </a:extLst>
+          </p:cNvPr>
+          <p:cNvSpPr txBox="1"/>
+          <p:nvPr/>
+        </p:nvSpPr>
+        <p:spPr>
+          <a:xfrm>
+            <a:off x="331751" y="3787858"/>
+            <a:ext cx="3371316" cy="923330"/>
+          </a:xfrm>
+          <a:prstGeom prst="rect">
+            <a:avLst/>
+          </a:prstGeom>
+          <a:noFill/>
+          <a:ln>
+            <a:solidFill>
+              <a:schemeClr val="tx1"/>
+            </a:solidFill>
+          </a:ln>
+        </p:spPr>
+        <p:txBody>
+          <a:bodyPr wrap="square" rtlCol="0">
+            <a:spAutoFit/>
+          </a:bodyPr>
+          <a:lstStyle/>
+          <a:p>
+            <a:r>
+              <a:rPr lang="en-US" dirty="0"/>
+              <a:t>What are the top 5 companies that have the most jobs for the selected job title?</a:t>
+            </a:r>
+          </a:p>
+        </p:txBody>
+      </p:sp>
+      <p:sp>
+        <p:nvSpPr>
+          <p:cNvPr id="14" name="Arrow: Down 13">
+            <a:extLst>
+              <a:ext uri="{FF2B5EF4-FFF2-40B4-BE49-F238E27FC236}">
+                <a16:creationId xmlns:a16="http://schemas.microsoft.com/office/drawing/2014/main" id="{89736444-CE7B-42CD-9DDD-316F07E5B4A8}"/>
+              </a:ext>
+            </a:extLst>
+          </p:cNvPr>
+          <p:cNvSpPr/>
+          <p:nvPr/>
+        </p:nvSpPr>
+        <p:spPr>
+          <a:xfrm rot="16200000">
+            <a:off x="3992255" y="3926358"/>
+            <a:ext cx="290558" cy="646331"/>
+          </a:xfrm>
+          <a:prstGeom prst="downArrow">
+            <a:avLst/>
+          </a:prstGeom>
+        </p:spPr>
+        <p:style>
+          <a:lnRef idx="1">
+            <a:schemeClr val="accent1"/>
+          </a:lnRef>
+          <a:fillRef idx="3">
+            <a:schemeClr val="accent1"/>
+          </a:fillRef>
+          <a:effectRef idx="2">
+            <a:schemeClr val="accent1"/>
+          </a:effectRef>
+          <a:fontRef idx="minor">
+            <a:schemeClr val="lt1"/>
+          </a:fontRef>
+        </p:style>
+        <p:txBody>
+          <a:bodyPr rtlCol="0" anchor="ctr"/>
+          <a:lstStyle/>
+          <a:p>
+            <a:pPr algn="ctr"/>
+            <a:endParaRPr lang="en-US"/>
+          </a:p>
+        </p:txBody>
+      </p:sp>
+      <p:sp>
+        <p:nvSpPr>
+          <p:cNvPr id="15" name="TextBox 14">
+            <a:extLst>
+              <a:ext uri="{FF2B5EF4-FFF2-40B4-BE49-F238E27FC236}">
+                <a16:creationId xmlns:a16="http://schemas.microsoft.com/office/drawing/2014/main" id="{10CB8E4E-D7E1-4272-AF35-2CD7FB22FD4A}"/>
+              </a:ext>
+            </a:extLst>
+          </p:cNvPr>
+          <p:cNvSpPr txBox="1"/>
+          <p:nvPr/>
+        </p:nvSpPr>
+        <p:spPr>
+          <a:xfrm>
+            <a:off x="331751" y="1308553"/>
+            <a:ext cx="3371316" cy="369332"/>
+          </a:xfrm>
+          <a:prstGeom prst="rect">
+            <a:avLst/>
+          </a:prstGeom>
+          <a:noFill/>
+          <a:ln>
+            <a:solidFill>
+              <a:schemeClr val="tx1"/>
+            </a:solidFill>
+          </a:ln>
+        </p:spPr>
+        <p:txBody>
+          <a:bodyPr wrap="square" rtlCol="0">
+            <a:spAutoFit/>
+          </a:bodyPr>
+          <a:lstStyle/>
+          <a:p>
+            <a:r>
+              <a:rPr lang="en-US" dirty="0"/>
+              <a:t>What are the top 5 Job Titles?</a:t>
+            </a:r>
+          </a:p>
+        </p:txBody>
+      </p:sp>
+      <p:sp>
+        <p:nvSpPr>
+          <p:cNvPr id="17" name="TextBox 16">
+            <a:extLst>
+              <a:ext uri="{FF2B5EF4-FFF2-40B4-BE49-F238E27FC236}">
+                <a16:creationId xmlns:a16="http://schemas.microsoft.com/office/drawing/2014/main" id="{A5021566-899E-4664-B83C-BE74966ADB75}"/>
+              </a:ext>
+            </a:extLst>
+          </p:cNvPr>
+          <p:cNvSpPr txBox="1"/>
+          <p:nvPr/>
+        </p:nvSpPr>
+        <p:spPr>
+          <a:xfrm>
+            <a:off x="4572000" y="1308553"/>
+            <a:ext cx="4051972" cy="369332"/>
+          </a:xfrm>
+          <a:prstGeom prst="rect">
+            <a:avLst/>
+          </a:prstGeom>
+          <a:noFill/>
+          <a:ln>
+            <a:solidFill>
+              <a:schemeClr val="tx1"/>
+            </a:solidFill>
+          </a:ln>
+        </p:spPr>
+        <p:txBody>
+          <a:bodyPr wrap="square" rtlCol="0">
+            <a:spAutoFit/>
+          </a:bodyPr>
+          <a:lstStyle/>
+          <a:p>
+            <a:r>
+              <a:rPr lang="en-US" dirty="0"/>
+              <a:t>Where are the companies located?</a:t>
+            </a:r>
+          </a:p>
+        </p:txBody>
+      </p:sp>
+      <p:pic>
+        <p:nvPicPr>
+          <p:cNvPr id="18" name="Picture 17">
+            <a:extLst>
+              <a:ext uri="{FF2B5EF4-FFF2-40B4-BE49-F238E27FC236}">
+                <a16:creationId xmlns:a16="http://schemas.microsoft.com/office/drawing/2014/main" id="{52AC2D2B-AE05-4CDE-84ED-86075841C647}"/>
+              </a:ext>
+            </a:extLst>
+          </p:cNvPr>
+          <p:cNvPicPr>
+            <a:picLocks noChangeAspect="1"/>
+          </p:cNvPicPr>
+          <p:nvPr/>
+        </p:nvPicPr>
+        <p:blipFill>
+          <a:blip r:embed="rId4"/>
+          <a:stretch>
+            <a:fillRect/>
+          </a:stretch>
+        </p:blipFill>
+        <p:spPr>
+          <a:xfrm>
+            <a:off x="4572000" y="1963401"/>
+            <a:ext cx="4051972" cy="1286014"/>
+          </a:xfrm>
+          <a:prstGeom prst="rect">
+            <a:avLst/>
+          </a:prstGeom>
+          <a:ln>
+            <a:solidFill>
+              <a:schemeClr val="tx1"/>
+            </a:solidFill>
+          </a:ln>
+        </p:spPr>
+      </p:pic>
+      <p:sp>
+        <p:nvSpPr>
+          <p:cNvPr id="19" name="Arrow: Down 18">
+            <a:extLst>
+              <a:ext uri="{FF2B5EF4-FFF2-40B4-BE49-F238E27FC236}">
+                <a16:creationId xmlns:a16="http://schemas.microsoft.com/office/drawing/2014/main" id="{11351B3F-4A93-4150-BA5E-87B59FE10585}"/>
+              </a:ext>
+            </a:extLst>
+          </p:cNvPr>
+          <p:cNvSpPr/>
+          <p:nvPr/>
+        </p:nvSpPr>
+        <p:spPr>
+          <a:xfrm>
+            <a:off x="6629518" y="1600043"/>
+            <a:ext cx="290558" cy="646331"/>
+          </a:xfrm>
+          <a:prstGeom prst="downArrow">
+            <a:avLst/>
+          </a:prstGeom>
+        </p:spPr>
+        <p:style>
+          <a:lnRef idx="1">
+            <a:schemeClr val="accent1"/>
+          </a:lnRef>
+          <a:fillRef idx="3">
+            <a:schemeClr val="accent1"/>
+          </a:fillRef>
+          <a:effectRef idx="2">
+            <a:schemeClr val="accent1"/>
+          </a:effectRef>
+          <a:fontRef idx="minor">
+            <a:schemeClr val="lt1"/>
+          </a:fontRef>
+        </p:style>
+        <p:txBody>
+          <a:bodyPr rtlCol="0" anchor="ctr"/>
+          <a:lstStyle/>
+          <a:p>
+            <a:pPr algn="ctr"/>
+            <a:endParaRPr lang="en-US"/>
+          </a:p>
+        </p:txBody>
+      </p:sp>
+      <p:sp>
+        <p:nvSpPr>
+          <p:cNvPr id="20" name="Arrow: Down 19">
+            <a:extLst>
+              <a:ext uri="{FF2B5EF4-FFF2-40B4-BE49-F238E27FC236}">
+                <a16:creationId xmlns:a16="http://schemas.microsoft.com/office/drawing/2014/main" id="{EC24CE46-AC22-4C5E-BE54-BAC7468F9C86}"/>
+              </a:ext>
+            </a:extLst>
+          </p:cNvPr>
+          <p:cNvSpPr/>
+          <p:nvPr/>
+        </p:nvSpPr>
+        <p:spPr>
+          <a:xfrm>
+            <a:off x="1933366" y="1600043"/>
+            <a:ext cx="290558" cy="646331"/>
+          </a:xfrm>
+          <a:prstGeom prst="downArrow">
+            <a:avLst/>
+          </a:prstGeom>
+        </p:spPr>
+        <p:style>
+          <a:lnRef idx="1">
+            <a:schemeClr val="accent1"/>
+          </a:lnRef>
+          <a:fillRef idx="3">
+            <a:schemeClr val="accent1"/>
+          </a:fillRef>
+          <a:effectRef idx="2">
+            <a:schemeClr val="accent1"/>
+          </a:effectRef>
+          <a:fontRef idx="minor">
+            <a:schemeClr val="lt1"/>
+          </a:fontRef>
+        </p:style>
+        <p:txBody>
+          <a:bodyPr rtlCol="0" anchor="ctr"/>
+          <a:lstStyle/>
+          <a:p>
+            <a:pPr algn="ctr"/>
+            <a:endParaRPr lang="en-US"/>
+          </a:p>
+        </p:txBody>
+      </p:sp>
     </p:spTree>
     <p:extLst>
       <p:ext uri="{BB962C8B-B14F-4D97-AF65-F5344CB8AC3E}">
-        <p14:creationId xmlns:p14="http://schemas.microsoft.com/office/powerpoint/2010/main" val="52479124"/>
+        <p14:creationId xmlns:p14="http://schemas.microsoft.com/office/powerpoint/2010/main" val="1611715792"/>
       </p:ext>
     </p:extLst>
   </p:cSld>
@@ -7164,82 +6557,21 @@
             <p:ph type="title"/>
           </p:nvPr>
         </p:nvSpPr>
-        <p:spPr/>
+        <p:spPr>
+          <a:xfrm>
+            <a:off x="144966" y="205978"/>
+            <a:ext cx="4296405" cy="3373563"/>
+          </a:xfrm>
+        </p:spPr>
         <p:txBody>
           <a:bodyPr>
-            <a:normAutofit/>
+            <a:normAutofit fontScale="90000"/>
           </a:bodyPr>
           <a:lstStyle/>
           <a:p>
             <a:r>
               <a:rPr lang="en-US" sz="4000" dirty="0"/>
-              <a:t>Use flask Python to pull data</a:t>
-            </a:r>
-          </a:p>
-        </p:txBody>
-      </p:sp>
-      <p:sp>
-        <p:nvSpPr>
-          <p:cNvPr id="3" name="Text Placeholder 2">
-            <a:extLst>
-              <a:ext uri="{FF2B5EF4-FFF2-40B4-BE49-F238E27FC236}">
-                <a16:creationId xmlns:a16="http://schemas.microsoft.com/office/drawing/2014/main" id="{1B71631B-FC55-44C4-B49D-B199C170F42D}"/>
-              </a:ext>
-            </a:extLst>
-          </p:cNvPr>
-          <p:cNvSpPr>
-            <a:spLocks noGrp="1"/>
-          </p:cNvSpPr>
-          <p:nvPr>
-            <p:ph type="body" idx="1"/>
-          </p:nvPr>
-        </p:nvSpPr>
-        <p:spPr>
-          <a:xfrm>
-            <a:off x="457200" y="1151335"/>
-            <a:ext cx="7755308" cy="479822"/>
-          </a:xfrm>
-        </p:spPr>
-        <p:txBody>
-          <a:bodyPr/>
-          <a:lstStyle/>
-          <a:p>
-            <a:r>
-              <a:rPr lang="en-US" dirty="0"/>
-              <a:t>Add screen shot</a:t>
-            </a:r>
-          </a:p>
-        </p:txBody>
-      </p:sp>
-      <p:sp>
-        <p:nvSpPr>
-          <p:cNvPr id="4" name="Content Placeholder 3">
-            <a:extLst>
-              <a:ext uri="{FF2B5EF4-FFF2-40B4-BE49-F238E27FC236}">
-                <a16:creationId xmlns:a16="http://schemas.microsoft.com/office/drawing/2014/main" id="{58EF3C7F-55D2-44CE-9522-7E79BEDC6FE1}"/>
-              </a:ext>
-            </a:extLst>
-          </p:cNvPr>
-          <p:cNvSpPr>
-            <a:spLocks noGrp="1"/>
-          </p:cNvSpPr>
-          <p:nvPr>
-            <p:ph sz="half" idx="2"/>
-          </p:nvPr>
-        </p:nvSpPr>
-        <p:spPr>
-          <a:xfrm>
-            <a:off x="457200" y="1631156"/>
-            <a:ext cx="7755308" cy="2963466"/>
-          </a:xfrm>
-        </p:spPr>
-        <p:txBody>
-          <a:bodyPr/>
-          <a:lstStyle/>
-          <a:p>
-            <a:r>
-              <a:rPr lang="en-US" dirty="0"/>
-              <a:t>Python Flask–powered API, HTML/CSS, JavaScript, and at least one database (SQL, MongoDB, SQLite, etc.).</a:t>
+              <a:t>The result is a dashboard page with multiple charts that update from the same data</a:t>
             </a:r>
           </a:p>
         </p:txBody>
@@ -7274,10 +6606,129 @@
           </a:p>
         </p:txBody>
       </p:sp>
+      <p:pic>
+        <p:nvPicPr>
+          <p:cNvPr id="14" name="Picture 13">
+            <a:extLst>
+              <a:ext uri="{FF2B5EF4-FFF2-40B4-BE49-F238E27FC236}">
+                <a16:creationId xmlns:a16="http://schemas.microsoft.com/office/drawing/2014/main" id="{7AFFF7A7-C615-45B7-B9C2-3B21BF0A0D42}"/>
+              </a:ext>
+            </a:extLst>
+          </p:cNvPr>
+          <p:cNvPicPr>
+            <a:picLocks noChangeAspect="1"/>
+          </p:cNvPicPr>
+          <p:nvPr/>
+        </p:nvPicPr>
+        <p:blipFill>
+          <a:blip r:embed="rId2"/>
+          <a:stretch>
+            <a:fillRect/>
+          </a:stretch>
+        </p:blipFill>
+        <p:spPr>
+          <a:xfrm>
+            <a:off x="4575727" y="205978"/>
+            <a:ext cx="3984171" cy="4444082"/>
+          </a:xfrm>
+          <a:prstGeom prst="rect">
+            <a:avLst/>
+          </a:prstGeom>
+          <a:ln>
+            <a:solidFill>
+              <a:srgbClr val="7030A0"/>
+            </a:solidFill>
+          </a:ln>
+        </p:spPr>
+      </p:pic>
+      <p:sp>
+        <p:nvSpPr>
+          <p:cNvPr id="15" name="TextBox 14">
+            <a:extLst>
+              <a:ext uri="{FF2B5EF4-FFF2-40B4-BE49-F238E27FC236}">
+                <a16:creationId xmlns:a16="http://schemas.microsoft.com/office/drawing/2014/main" id="{1C01A2AE-94D1-49A2-9DC3-E3CD7F449A87}"/>
+              </a:ext>
+            </a:extLst>
+          </p:cNvPr>
+          <p:cNvSpPr txBox="1"/>
+          <p:nvPr/>
+        </p:nvSpPr>
+        <p:spPr>
+          <a:xfrm>
+            <a:off x="434677" y="3553724"/>
+            <a:ext cx="3810927" cy="646331"/>
+          </a:xfrm>
+          <a:prstGeom prst="rect">
+            <a:avLst/>
+          </a:prstGeom>
+          <a:noFill/>
+          <a:ln>
+            <a:solidFill>
+              <a:schemeClr val="tx1"/>
+            </a:solidFill>
+          </a:ln>
+        </p:spPr>
+        <p:txBody>
+          <a:bodyPr wrap="square" rtlCol="0">
+            <a:spAutoFit/>
+          </a:bodyPr>
+          <a:lstStyle/>
+          <a:p>
+            <a:r>
+              <a:rPr lang="en-US" dirty="0"/>
+              <a:t>Data Science search returned 8900 records (YIKES!) </a:t>
+            </a:r>
+          </a:p>
+        </p:txBody>
+      </p:sp>
+      <p:sp>
+        <p:nvSpPr>
+          <p:cNvPr id="16" name="Arrow: Down 15">
+            <a:extLst>
+              <a:ext uri="{FF2B5EF4-FFF2-40B4-BE49-F238E27FC236}">
+                <a16:creationId xmlns:a16="http://schemas.microsoft.com/office/drawing/2014/main" id="{89F0DA3F-8961-4203-A676-61134DAFB0FB}"/>
+              </a:ext>
+            </a:extLst>
+          </p:cNvPr>
+          <p:cNvSpPr/>
+          <p:nvPr/>
+        </p:nvSpPr>
+        <p:spPr>
+          <a:xfrm rot="16200000">
+            <a:off x="4234681" y="3553723"/>
+            <a:ext cx="290558" cy="646331"/>
+          </a:xfrm>
+          <a:prstGeom prst="downArrow">
+            <a:avLst/>
+          </a:prstGeom>
+        </p:spPr>
+        <p:style>
+          <a:lnRef idx="1">
+            <a:schemeClr val="accent1"/>
+          </a:lnRef>
+          <a:fillRef idx="3">
+            <a:schemeClr val="accent1"/>
+          </a:fillRef>
+          <a:effectRef idx="2">
+            <a:schemeClr val="accent1"/>
+          </a:effectRef>
+          <a:fontRef idx="minor">
+            <a:schemeClr val="lt1"/>
+          </a:fontRef>
+        </p:style>
+        <p:txBody>
+          <a:bodyPr rtlCol="0" anchor="ctr"/>
+          <a:lstStyle/>
+          <a:p>
+            <a:pPr algn="ctr"/>
+            <a:endParaRPr lang="en-US"/>
+          </a:p>
+        </p:txBody>
+      </p:sp>
     </p:spTree>
     <p:extLst>
       <p:ext uri="{BB962C8B-B14F-4D97-AF65-F5344CB8AC3E}">
-        <p14:creationId xmlns:p14="http://schemas.microsoft.com/office/powerpoint/2010/main" val="1155089661"/>
+        <p14:creationId xmlns:p14="http://schemas.microsoft.com/office/powerpoint/2010/main" val="52479124"/>
       </p:ext>
     </p:extLst>
   </p:cSld>
@@ -7306,10 +6757,10 @@
       </p:grpSpPr>
       <p:sp>
         <p:nvSpPr>
-          <p:cNvPr id="5" name="Title 4">
+          <p:cNvPr id="2" name="Title 1">
             <a:extLst>
               <a:ext uri="{FF2B5EF4-FFF2-40B4-BE49-F238E27FC236}">
-                <a16:creationId xmlns:a16="http://schemas.microsoft.com/office/drawing/2014/main" id="{D4296CC1-D52C-4736-AB4E-1D2D2C75C616}"/>
+                <a16:creationId xmlns:a16="http://schemas.microsoft.com/office/drawing/2014/main" id="{79FC11AE-F273-47F4-BC84-CFD321BD225F}"/>
               </a:ext>
             </a:extLst>
           </p:cNvPr>
@@ -7327,14 +6778,20 @@
           <a:p>
             <a:r>
               <a:rPr lang="en-US" dirty="0"/>
-              <a:t>Sample Data</a:t>
-            </a:r>
-          </a:p>
-        </p:txBody>
-      </p:sp>
-      <p:sp>
-        <p:nvSpPr>
-          <p:cNvPr id="4" name="Slide Number Placeholder 3"/>
+              <a:t>Any Questions?</a:t>
+            </a:r>
+          </a:p>
+        </p:txBody>
+      </p:sp>
+      <p:sp>
+        <p:nvSpPr>
+          <p:cNvPr id="7" name="Slide Number Placeholder 6">
+            <a:extLst>
+              <a:ext uri="{FF2B5EF4-FFF2-40B4-BE49-F238E27FC236}">
+                <a16:creationId xmlns:a16="http://schemas.microsoft.com/office/drawing/2014/main" id="{BF808949-478F-4D9A-A324-EA260369D976}"/>
+              </a:ext>
+            </a:extLst>
+          </p:cNvPr>
           <p:cNvSpPr>
             <a:spLocks noGrp="1"/>
           </p:cNvSpPr>
@@ -7352,662 +6809,14 @@
               <a:pPr/>
               <a:t>8</a:t>
             </a:fld>
-            <a:endParaRPr lang="en-US" dirty="0"/>
-          </a:p>
-        </p:txBody>
-      </p:sp>
-      <p:sp>
-        <p:nvSpPr>
-          <p:cNvPr id="11" name="Speech Bubble: Rectangle 10">
-            <a:extLst>
-              <a:ext uri="{FF2B5EF4-FFF2-40B4-BE49-F238E27FC236}">
-                <a16:creationId xmlns:a16="http://schemas.microsoft.com/office/drawing/2014/main" id="{33A16886-DB0D-4279-B6CE-6C8A1249649B}"/>
-              </a:ext>
-            </a:extLst>
-          </p:cNvPr>
-          <p:cNvSpPr/>
-          <p:nvPr/>
-        </p:nvSpPr>
-        <p:spPr>
-          <a:xfrm>
-            <a:off x="5173456" y="1018599"/>
-            <a:ext cx="1117734" cy="299826"/>
-          </a:xfrm>
-          <a:prstGeom prst="wedgeRectCallout">
-            <a:avLst>
-              <a:gd name="adj1" fmla="val -86076"/>
-              <a:gd name="adj2" fmla="val 36563"/>
-            </a:avLst>
-          </a:prstGeom>
-        </p:spPr>
-        <p:style>
-          <a:lnRef idx="1">
-            <a:schemeClr val="dk1"/>
-          </a:lnRef>
-          <a:fillRef idx="2">
-            <a:schemeClr val="dk1"/>
-          </a:fillRef>
-          <a:effectRef idx="1">
-            <a:schemeClr val="dk1"/>
-          </a:effectRef>
-          <a:fontRef idx="minor">
-            <a:schemeClr val="dk1"/>
-          </a:fontRef>
-        </p:style>
-        <p:txBody>
-          <a:bodyPr rtlCol="0" anchor="ctr"/>
-          <a:lstStyle/>
-          <a:p>
-            <a:pPr algn="ctr"/>
-            <a:r>
-              <a:rPr lang="en-US" sz="1000" dirty="0"/>
-              <a:t>Import Daily Stock Price</a:t>
-            </a:r>
-          </a:p>
-        </p:txBody>
-      </p:sp>
-      <p:sp>
-        <p:nvSpPr>
-          <p:cNvPr id="3" name="Content Placeholder 2">
-            <a:extLst>
-              <a:ext uri="{FF2B5EF4-FFF2-40B4-BE49-F238E27FC236}">
-                <a16:creationId xmlns:a16="http://schemas.microsoft.com/office/drawing/2014/main" id="{68CB2294-DAA7-4004-8EFD-36F55B70ED9A}"/>
-              </a:ext>
-            </a:extLst>
-          </p:cNvPr>
-          <p:cNvSpPr>
-            <a:spLocks noGrp="1"/>
-          </p:cNvSpPr>
-          <p:nvPr>
-            <p:ph idx="1"/>
-          </p:nvPr>
-        </p:nvSpPr>
-        <p:spPr>
-          <a:xfrm>
-            <a:off x="457200" y="1771668"/>
-            <a:ext cx="7137400" cy="2417228"/>
-          </a:xfrm>
-        </p:spPr>
-        <p:txBody>
-          <a:bodyPr>
-            <a:normAutofit fontScale="47500" lnSpcReduction="20000"/>
-          </a:bodyPr>
-          <a:lstStyle/>
-          <a:p>
-            <a:pPr marL="0" indent="0">
-              <a:buNone/>
-            </a:pPr>
-            <a:r>
-              <a:rPr lang="en-US" sz="3200" dirty="0" err="1">
-                <a:hlinkClick r:id="rId2"/>
-              </a:rPr>
-              <a:t>yfinance</a:t>
-            </a:r>
-            <a:r>
-              <a:rPr lang="en-US" sz="3200" dirty="0"/>
-              <a:t> - # Yahoo! Finance market data </a:t>
-            </a:r>
-          </a:p>
-          <a:p>
-            <a:endParaRPr lang="en-US" dirty="0"/>
-          </a:p>
-          <a:p>
-            <a:r>
-              <a:rPr lang="en-US" dirty="0"/>
-              <a:t>https://github.com/ranaroussi/yfinance</a:t>
-            </a:r>
-          </a:p>
-          <a:p>
-            <a:r>
-              <a:rPr lang="en-US" dirty="0"/>
-              <a:t> Install </a:t>
-            </a:r>
-            <a:r>
-              <a:rPr lang="en-US" dirty="0" err="1"/>
-              <a:t>yfinance</a:t>
-            </a:r>
-            <a:r>
-              <a:rPr lang="en-US" dirty="0"/>
-              <a:t> using pip:</a:t>
-            </a:r>
-          </a:p>
-          <a:p>
-            <a:pPr marL="0" indent="0">
-              <a:buNone/>
-            </a:pPr>
-            <a:r>
-              <a:rPr lang="en-US" dirty="0"/>
-              <a:t>	  $ pip install </a:t>
-            </a:r>
-            <a:r>
-              <a:rPr lang="en-US" dirty="0" err="1"/>
-              <a:t>yfinance</a:t>
-            </a:r>
-            <a:r>
-              <a:rPr lang="en-US" dirty="0"/>
-              <a:t> --upgrade --no-cache-</a:t>
-            </a:r>
-            <a:r>
-              <a:rPr lang="en-US" dirty="0" err="1"/>
-              <a:t>dir</a:t>
-            </a:r>
-            <a:endParaRPr lang="en-US" dirty="0"/>
-          </a:p>
-          <a:p>
-            <a:pPr marL="0" indent="0">
-              <a:buNone/>
-            </a:pPr>
-            <a:endParaRPr lang="en-US" dirty="0"/>
-          </a:p>
-          <a:p>
-            <a:pPr marL="0" indent="0">
-              <a:buNone/>
-            </a:pPr>
-            <a:r>
-              <a:rPr lang="en-US" dirty="0"/>
-              <a:t>Requirements</a:t>
-            </a:r>
-          </a:p>
-          <a:p>
-            <a:r>
-              <a:rPr lang="en-US" dirty="0"/>
-              <a:t>  Python &gt;= 2.7, 3.4+</a:t>
-            </a:r>
-          </a:p>
-          <a:p>
-            <a:r>
-              <a:rPr lang="en-US" dirty="0"/>
-              <a:t>  Pandas &gt;=0.23.1</a:t>
-            </a:r>
-          </a:p>
-        </p:txBody>
-      </p:sp>
-      <p:pic>
-        <p:nvPicPr>
-          <p:cNvPr id="15" name="Picture 14">
-            <a:extLst>
-              <a:ext uri="{FF2B5EF4-FFF2-40B4-BE49-F238E27FC236}">
-                <a16:creationId xmlns:a16="http://schemas.microsoft.com/office/drawing/2014/main" id="{C7CDAB26-839C-4423-9A32-28B7FA19C983}"/>
-              </a:ext>
-            </a:extLst>
-          </p:cNvPr>
-          <p:cNvPicPr>
-            <a:picLocks noChangeAspect="1"/>
-          </p:cNvPicPr>
-          <p:nvPr/>
-        </p:nvPicPr>
-        <p:blipFill>
-          <a:blip r:embed="rId3"/>
-          <a:stretch>
-            <a:fillRect/>
-          </a:stretch>
-        </p:blipFill>
-        <p:spPr>
-          <a:xfrm>
-            <a:off x="5081125" y="2920091"/>
-            <a:ext cx="2289041" cy="1211845"/>
-          </a:xfrm>
-          <a:prstGeom prst="rect">
-            <a:avLst/>
-          </a:prstGeom>
-          <a:ln>
-            <a:noFill/>
-          </a:ln>
-          <a:effectLst>
-            <a:outerShdw blurRad="190500" algn="tl" rotWithShape="0">
-              <a:srgbClr val="000000">
-                <a:alpha val="70000"/>
-              </a:srgbClr>
-            </a:outerShdw>
-          </a:effectLst>
-        </p:spPr>
-      </p:pic>
-      <p:sp>
-        <p:nvSpPr>
-          <p:cNvPr id="18" name="Arrow: Right 17">
-            <a:extLst>
-              <a:ext uri="{FF2B5EF4-FFF2-40B4-BE49-F238E27FC236}">
-                <a16:creationId xmlns:a16="http://schemas.microsoft.com/office/drawing/2014/main" id="{C87352A8-8B74-4311-B6FE-F34E9C40C723}"/>
-              </a:ext>
-            </a:extLst>
-          </p:cNvPr>
-          <p:cNvSpPr/>
-          <p:nvPr/>
-        </p:nvSpPr>
-        <p:spPr>
-          <a:xfrm rot="5400000">
-            <a:off x="6176318" y="2645277"/>
-            <a:ext cx="424297" cy="293257"/>
-          </a:xfrm>
-          <a:prstGeom prst="rightArrow">
-            <a:avLst/>
-          </a:prstGeom>
-        </p:spPr>
-        <p:style>
-          <a:lnRef idx="1">
-            <a:schemeClr val="accent1"/>
-          </a:lnRef>
-          <a:fillRef idx="3">
-            <a:schemeClr val="accent1"/>
-          </a:fillRef>
-          <a:effectRef idx="2">
-            <a:schemeClr val="accent1"/>
-          </a:effectRef>
-          <a:fontRef idx="minor">
-            <a:schemeClr val="lt1"/>
-          </a:fontRef>
-        </p:style>
-        <p:txBody>
-          <a:bodyPr rtlCol="0" anchor="ctr"/>
-          <a:lstStyle/>
-          <a:p>
-            <a:pPr algn="ctr"/>
             <a:endParaRPr lang="en-US"/>
-          </a:p>
-        </p:txBody>
-      </p:sp>
-      <p:pic>
-        <p:nvPicPr>
-          <p:cNvPr id="13" name="Picture 12">
-            <a:extLst>
-              <a:ext uri="{FF2B5EF4-FFF2-40B4-BE49-F238E27FC236}">
-                <a16:creationId xmlns:a16="http://schemas.microsoft.com/office/drawing/2014/main" id="{ED176FD6-EEDE-4DF3-BEFD-7DFD6A30CA0C}"/>
-              </a:ext>
-            </a:extLst>
-          </p:cNvPr>
-          <p:cNvPicPr>
-            <a:picLocks noChangeAspect="1"/>
-          </p:cNvPicPr>
-          <p:nvPr/>
-        </p:nvPicPr>
-        <p:blipFill>
-          <a:blip r:embed="rId4"/>
-          <a:stretch>
-            <a:fillRect/>
-          </a:stretch>
-        </p:blipFill>
-        <p:spPr>
-          <a:xfrm>
-            <a:off x="5243947" y="1501060"/>
-            <a:ext cx="3192028" cy="1198563"/>
-          </a:xfrm>
-          <a:prstGeom prst="rect">
-            <a:avLst/>
-          </a:prstGeom>
-          <a:ln>
-            <a:noFill/>
-          </a:ln>
-          <a:effectLst>
-            <a:outerShdw blurRad="190500" algn="tl" rotWithShape="0">
-              <a:srgbClr val="000000">
-                <a:alpha val="70000"/>
-              </a:srgbClr>
-            </a:outerShdw>
-          </a:effectLst>
-        </p:spPr>
-      </p:pic>
-      <p:sp>
-        <p:nvSpPr>
-          <p:cNvPr id="17" name="Arrow: Right 16">
-            <a:extLst>
-              <a:ext uri="{FF2B5EF4-FFF2-40B4-BE49-F238E27FC236}">
-                <a16:creationId xmlns:a16="http://schemas.microsoft.com/office/drawing/2014/main" id="{AD226FA7-6C6A-4DFA-84C0-2E4EB5133A85}"/>
-              </a:ext>
-            </a:extLst>
-          </p:cNvPr>
-          <p:cNvSpPr/>
-          <p:nvPr/>
-        </p:nvSpPr>
-        <p:spPr>
-          <a:xfrm rot="1195432">
-            <a:off x="4728701" y="1439420"/>
-            <a:ext cx="565062" cy="293257"/>
-          </a:xfrm>
-          <a:prstGeom prst="rightArrow">
-            <a:avLst/>
-          </a:prstGeom>
-        </p:spPr>
-        <p:style>
-          <a:lnRef idx="1">
-            <a:schemeClr val="accent1"/>
-          </a:lnRef>
-          <a:fillRef idx="3">
-            <a:schemeClr val="accent1"/>
-          </a:fillRef>
-          <a:effectRef idx="2">
-            <a:schemeClr val="accent1"/>
-          </a:effectRef>
-          <a:fontRef idx="minor">
-            <a:schemeClr val="lt1"/>
-          </a:fontRef>
-        </p:style>
-        <p:txBody>
-          <a:bodyPr rtlCol="0" anchor="ctr"/>
-          <a:lstStyle/>
-          <a:p>
-            <a:pPr algn="ctr"/>
-            <a:endParaRPr lang="en-US"/>
-          </a:p>
-        </p:txBody>
-      </p:sp>
-      <p:pic>
-        <p:nvPicPr>
-          <p:cNvPr id="7" name="Picture 6">
-            <a:extLst>
-              <a:ext uri="{FF2B5EF4-FFF2-40B4-BE49-F238E27FC236}">
-                <a16:creationId xmlns:a16="http://schemas.microsoft.com/office/drawing/2014/main" id="{2D264B1A-F31D-4467-AAA4-C9BBD1293A63}"/>
-              </a:ext>
-            </a:extLst>
-          </p:cNvPr>
-          <p:cNvPicPr>
-            <a:picLocks noChangeAspect="1"/>
-          </p:cNvPicPr>
-          <p:nvPr/>
-        </p:nvPicPr>
-        <p:blipFill>
-          <a:blip r:embed="rId5"/>
-          <a:stretch>
-            <a:fillRect/>
-          </a:stretch>
-        </p:blipFill>
-        <p:spPr>
-          <a:xfrm>
-            <a:off x="1092163" y="1267267"/>
-            <a:ext cx="3705958" cy="445039"/>
-          </a:xfrm>
-          <a:prstGeom prst="rect">
-            <a:avLst/>
-          </a:prstGeom>
-          <a:ln>
-            <a:noFill/>
-          </a:ln>
-          <a:effectLst>
-            <a:outerShdw blurRad="190500" algn="tl" rotWithShape="0">
-              <a:srgbClr val="000000">
-                <a:alpha val="70000"/>
-              </a:srgbClr>
-            </a:outerShdw>
-          </a:effectLst>
-        </p:spPr>
-      </p:pic>
-      <p:pic>
-        <p:nvPicPr>
-          <p:cNvPr id="20" name="Picture 19">
-            <a:extLst>
-              <a:ext uri="{FF2B5EF4-FFF2-40B4-BE49-F238E27FC236}">
-                <a16:creationId xmlns:a16="http://schemas.microsoft.com/office/drawing/2014/main" id="{652C8DC6-5401-4AFC-82DD-2207DA987AA6}"/>
-              </a:ext>
-            </a:extLst>
-          </p:cNvPr>
-          <p:cNvPicPr>
-            <a:picLocks noChangeAspect="1"/>
-          </p:cNvPicPr>
-          <p:nvPr/>
-        </p:nvPicPr>
-        <p:blipFill>
-          <a:blip r:embed="rId6"/>
-          <a:stretch>
-            <a:fillRect/>
-          </a:stretch>
-        </p:blipFill>
-        <p:spPr>
-          <a:xfrm>
-            <a:off x="674111" y="4322866"/>
-            <a:ext cx="6719136" cy="306966"/>
-          </a:xfrm>
-          <a:prstGeom prst="rect">
-            <a:avLst/>
-          </a:prstGeom>
-          <a:ln>
-            <a:noFill/>
-          </a:ln>
-          <a:effectLst>
-            <a:outerShdw blurRad="190500" algn="tl" rotWithShape="0">
-              <a:srgbClr val="000000">
-                <a:alpha val="70000"/>
-              </a:srgbClr>
-            </a:outerShdw>
-          </a:effectLst>
-        </p:spPr>
-      </p:pic>
-      <p:sp>
-        <p:nvSpPr>
-          <p:cNvPr id="21" name="Speech Bubble: Rectangle 20">
-            <a:extLst>
-              <a:ext uri="{FF2B5EF4-FFF2-40B4-BE49-F238E27FC236}">
-                <a16:creationId xmlns:a16="http://schemas.microsoft.com/office/drawing/2014/main" id="{96DFCE6E-2ECF-437A-A066-11B2FA473E47}"/>
-              </a:ext>
-            </a:extLst>
-          </p:cNvPr>
-          <p:cNvSpPr/>
-          <p:nvPr/>
-        </p:nvSpPr>
-        <p:spPr>
-          <a:xfrm>
-            <a:off x="2945142" y="3736962"/>
-            <a:ext cx="1398258" cy="451934"/>
-          </a:xfrm>
-          <a:prstGeom prst="wedgeRectCallout">
-            <a:avLst>
-              <a:gd name="adj1" fmla="val 79136"/>
-              <a:gd name="adj2" fmla="val 75947"/>
-            </a:avLst>
-          </a:prstGeom>
-        </p:spPr>
-        <p:style>
-          <a:lnRef idx="1">
-            <a:schemeClr val="dk1"/>
-          </a:lnRef>
-          <a:fillRef idx="2">
-            <a:schemeClr val="dk1"/>
-          </a:fillRef>
-          <a:effectRef idx="1">
-            <a:schemeClr val="dk1"/>
-          </a:effectRef>
-          <a:fontRef idx="minor">
-            <a:schemeClr val="dk1"/>
-          </a:fontRef>
-        </p:style>
-        <p:txBody>
-          <a:bodyPr rtlCol="0" anchor="ctr"/>
-          <a:lstStyle/>
-          <a:p>
-            <a:pPr algn="ctr"/>
-            <a:r>
-              <a:rPr lang="en-US" sz="1000" dirty="0"/>
-              <a:t>Each stock’s CSV data merged with complete CSV dataset</a:t>
-            </a:r>
-          </a:p>
-        </p:txBody>
-      </p:sp>
-      <p:sp>
-        <p:nvSpPr>
-          <p:cNvPr id="22" name="Speech Bubble: Rectangle 21">
-            <a:extLst>
-              <a:ext uri="{FF2B5EF4-FFF2-40B4-BE49-F238E27FC236}">
-                <a16:creationId xmlns:a16="http://schemas.microsoft.com/office/drawing/2014/main" id="{D8CBBEA0-AAF4-401E-900D-36CA96287A44}"/>
-              </a:ext>
-            </a:extLst>
-          </p:cNvPr>
-          <p:cNvSpPr/>
-          <p:nvPr/>
-        </p:nvSpPr>
-        <p:spPr>
-          <a:xfrm>
-            <a:off x="7546444" y="3587049"/>
-            <a:ext cx="728552" cy="299826"/>
-          </a:xfrm>
-          <a:prstGeom prst="wedgeRectCallout">
-            <a:avLst>
-              <a:gd name="adj1" fmla="val -88977"/>
-              <a:gd name="adj2" fmla="val -17510"/>
-            </a:avLst>
-          </a:prstGeom>
-        </p:spPr>
-        <p:style>
-          <a:lnRef idx="1">
-            <a:schemeClr val="dk1"/>
-          </a:lnRef>
-          <a:fillRef idx="2">
-            <a:schemeClr val="dk1"/>
-          </a:fillRef>
-          <a:effectRef idx="1">
-            <a:schemeClr val="dk1"/>
-          </a:effectRef>
-          <a:fontRef idx="minor">
-            <a:schemeClr val="dk1"/>
-          </a:fontRef>
-        </p:style>
-        <p:txBody>
-          <a:bodyPr rtlCol="0" anchor="ctr"/>
-          <a:lstStyle/>
-          <a:p>
-            <a:pPr algn="ctr"/>
-            <a:r>
-              <a:rPr lang="en-US" sz="1000" dirty="0"/>
-              <a:t>Required Fields</a:t>
-            </a:r>
-          </a:p>
-        </p:txBody>
-      </p:sp>
-      <p:sp>
-        <p:nvSpPr>
-          <p:cNvPr id="23" name="Arrow: Right 22">
-            <a:extLst>
-              <a:ext uri="{FF2B5EF4-FFF2-40B4-BE49-F238E27FC236}">
-                <a16:creationId xmlns:a16="http://schemas.microsoft.com/office/drawing/2014/main" id="{A0CAA4E0-D6BD-4462-9FA9-A2D604A52B25}"/>
-              </a:ext>
-            </a:extLst>
-          </p:cNvPr>
-          <p:cNvSpPr/>
-          <p:nvPr/>
-        </p:nvSpPr>
-        <p:spPr>
-          <a:xfrm rot="5400000">
-            <a:off x="6113056" y="4119862"/>
-            <a:ext cx="269106" cy="293257"/>
-          </a:xfrm>
-          <a:prstGeom prst="rightArrow">
-            <a:avLst/>
-          </a:prstGeom>
-        </p:spPr>
-        <p:style>
-          <a:lnRef idx="1">
-            <a:schemeClr val="accent1"/>
-          </a:lnRef>
-          <a:fillRef idx="3">
-            <a:schemeClr val="accent1"/>
-          </a:fillRef>
-          <a:effectRef idx="2">
-            <a:schemeClr val="accent1"/>
-          </a:effectRef>
-          <a:fontRef idx="minor">
-            <a:schemeClr val="lt1"/>
-          </a:fontRef>
-        </p:style>
-        <p:txBody>
-          <a:bodyPr rtlCol="0" anchor="ctr"/>
-          <a:lstStyle/>
-          <a:p>
-            <a:pPr algn="ctr"/>
-            <a:endParaRPr lang="en-US"/>
-          </a:p>
-        </p:txBody>
-      </p:sp>
-      <p:pic>
-        <p:nvPicPr>
-          <p:cNvPr id="12" name="Picture 11">
-            <a:extLst>
-              <a:ext uri="{FF2B5EF4-FFF2-40B4-BE49-F238E27FC236}">
-                <a16:creationId xmlns:a16="http://schemas.microsoft.com/office/drawing/2014/main" id="{DEDAA8D6-0FF0-4F13-9E5F-6168A7B5C467}"/>
-              </a:ext>
-            </a:extLst>
-          </p:cNvPr>
-          <p:cNvPicPr>
-            <a:picLocks noChangeAspect="1"/>
-          </p:cNvPicPr>
-          <p:nvPr/>
-        </p:nvPicPr>
-        <p:blipFill>
-          <a:blip r:embed="rId7"/>
-          <a:stretch>
-            <a:fillRect/>
-          </a:stretch>
-        </p:blipFill>
-        <p:spPr>
-          <a:xfrm>
-            <a:off x="411605" y="1525365"/>
-            <a:ext cx="469464" cy="179318"/>
-          </a:xfrm>
-          <a:prstGeom prst="rect">
-            <a:avLst/>
-          </a:prstGeom>
-          <a:ln>
-            <a:noFill/>
-          </a:ln>
-          <a:effectLst>
-            <a:outerShdw blurRad="190500" algn="tl" rotWithShape="0">
-              <a:srgbClr val="000000">
-                <a:alpha val="70000"/>
-              </a:srgbClr>
-            </a:outerShdw>
-          </a:effectLst>
-        </p:spPr>
-      </p:pic>
-      <p:sp>
-        <p:nvSpPr>
-          <p:cNvPr id="19" name="Speech Bubble: Rectangle 18">
-            <a:extLst>
-              <a:ext uri="{FF2B5EF4-FFF2-40B4-BE49-F238E27FC236}">
-                <a16:creationId xmlns:a16="http://schemas.microsoft.com/office/drawing/2014/main" id="{C8304D1F-84BE-445B-865D-AD6C81EC45BF}"/>
-              </a:ext>
-            </a:extLst>
-          </p:cNvPr>
-          <p:cNvSpPr/>
-          <p:nvPr/>
-        </p:nvSpPr>
-        <p:spPr>
-          <a:xfrm>
-            <a:off x="7518604" y="2798428"/>
-            <a:ext cx="605748" cy="299826"/>
-          </a:xfrm>
-          <a:prstGeom prst="wedgeRectCallout">
-            <a:avLst>
-              <a:gd name="adj1" fmla="val -28236"/>
-              <a:gd name="adj2" fmla="val -91051"/>
-            </a:avLst>
-          </a:prstGeom>
-        </p:spPr>
-        <p:style>
-          <a:lnRef idx="1">
-            <a:schemeClr val="dk1"/>
-          </a:lnRef>
-          <a:fillRef idx="2">
-            <a:schemeClr val="dk1"/>
-          </a:fillRef>
-          <a:effectRef idx="1">
-            <a:schemeClr val="dk1"/>
-          </a:effectRef>
-          <a:fontRef idx="minor">
-            <a:schemeClr val="dk1"/>
-          </a:fontRef>
-        </p:style>
-        <p:txBody>
-          <a:bodyPr rtlCol="0" anchor="ctr"/>
-          <a:lstStyle/>
-          <a:p>
-            <a:pPr algn="ctr"/>
-            <a:r>
-              <a:rPr lang="en-US" sz="1000" dirty="0"/>
-              <a:t>Raw data</a:t>
-            </a:r>
           </a:p>
         </p:txBody>
       </p:sp>
     </p:spTree>
     <p:extLst>
       <p:ext uri="{BB962C8B-B14F-4D97-AF65-F5344CB8AC3E}">
-        <p14:creationId xmlns:p14="http://schemas.microsoft.com/office/powerpoint/2010/main" val="3895435696"/>
+        <p14:creationId xmlns:p14="http://schemas.microsoft.com/office/powerpoint/2010/main" val="797651159"/>
       </p:ext>
     </p:extLst>
   </p:cSld>

</xml_diff>